<commit_message>
Edit Judge System next steps documents
</commit_message>
<xml_diff>
--- a/Documentation/Next steps/How to improve Computer science education.pptx
+++ b/Documentation/Next steps/How to improve Computer science education.pptx
@@ -3663,7 +3663,7 @@
           <a:p>
             <a:fld id="{2B85766F-5EC0-4797-B4D1-777FCB005B11}" type="datetimeFigureOut">
               <a:rPr lang="en-US" smtClean="0"/>
-              <a:t>1/31/2021</a:t>
+              <a:t>2/22/2021</a:t>
             </a:fld>
             <a:endParaRPr lang="en-US" dirty="0"/>
           </a:p>
@@ -3840,7 +3840,7 @@
           <a:p>
             <a:fld id="{B2B4B5EC-152C-4627-80C0-63B10D5574EF}" type="datetimeFigureOut">
               <a:rPr lang="en-US" smtClean="0"/>
-              <a:t>1/31/2021</a:t>
+              <a:t>2/22/2021</a:t>
             </a:fld>
             <a:endParaRPr lang="en-US" dirty="0"/>
           </a:p>
@@ -4164,7 +4164,7 @@
           <a:noFill/>
           <a:extLst>
             <a:ext uri="{909E8E84-426E-40dd-AFC4-6F175D3DCCD1}">
-              <a14:hiddenFill xmlns="" xmlns:a14="http://schemas.microsoft.com/office/drawing/2010/main">
+              <a14:hiddenFill xmlns:a14="http://schemas.microsoft.com/office/drawing/2010/main" xmlns="">
                 <a:solidFill>
                   <a:srgbClr val="FFFFFF"/>
                 </a:solidFill>
@@ -4223,7 +4223,7 @@
             </a:ln>
             <a:extLst>
               <a:ext uri="{91240B29-F687-4f45-9708-019B960494DF}">
-                <a14:hiddenLine xmlns="" xmlns:a14="http://schemas.microsoft.com/office/drawing/2010/main" w="9525">
+                <a14:hiddenLine xmlns:a14="http://schemas.microsoft.com/office/drawing/2010/main" xmlns="" w="9525">
                   <a:solidFill>
                     <a:srgbClr val="000000"/>
                   </a:solidFill>
@@ -4313,7 +4313,7 @@
             </a:ln>
             <a:extLst>
               <a:ext uri="{91240B29-F687-4f45-9708-019B960494DF}">
-                <a14:hiddenLine xmlns="" xmlns:a14="http://schemas.microsoft.com/office/drawing/2010/main" w="9525">
+                <a14:hiddenLine xmlns:a14="http://schemas.microsoft.com/office/drawing/2010/main" xmlns="" w="9525">
                   <a:solidFill>
                     <a:srgbClr val="000000"/>
                   </a:solidFill>
@@ -4403,7 +4403,7 @@
             </a:ln>
             <a:extLst>
               <a:ext uri="{91240B29-F687-4f45-9708-019B960494DF}">
-                <a14:hiddenLine xmlns="" xmlns:a14="http://schemas.microsoft.com/office/drawing/2010/main" w="9525">
+                <a14:hiddenLine xmlns:a14="http://schemas.microsoft.com/office/drawing/2010/main" xmlns="" w="9525">
                   <a:solidFill>
                     <a:srgbClr val="000000"/>
                   </a:solidFill>
@@ -4437,7 +4437,7 @@
             </a:ln>
             <a:extLst>
               <a:ext uri="{91240B29-F687-4f45-9708-019B960494DF}">
-                <a14:hiddenLine xmlns="" xmlns:a14="http://schemas.microsoft.com/office/drawing/2010/main" w="9525">
+                <a14:hiddenLine xmlns:a14="http://schemas.microsoft.com/office/drawing/2010/main" xmlns="" w="9525">
                   <a:solidFill>
                     <a:srgbClr val="000000"/>
                   </a:solidFill>
@@ -4527,7 +4527,7 @@
             </a:ln>
             <a:extLst>
               <a:ext uri="{91240B29-F687-4f45-9708-019B960494DF}">
-                <a14:hiddenLine xmlns="" xmlns:a14="http://schemas.microsoft.com/office/drawing/2010/main" w="9525">
+                <a14:hiddenLine xmlns:a14="http://schemas.microsoft.com/office/drawing/2010/main" xmlns="" w="9525">
                   <a:solidFill>
                     <a:srgbClr val="000000"/>
                   </a:solidFill>
@@ -4589,7 +4589,7 @@
             </a:ln>
             <a:extLst>
               <a:ext uri="{91240B29-F687-4f45-9708-019B960494DF}">
-                <a14:hiddenLine xmlns="" xmlns:a14="http://schemas.microsoft.com/office/drawing/2010/main" w="9525">
+                <a14:hiddenLine xmlns:a14="http://schemas.microsoft.com/office/drawing/2010/main" xmlns="" w="9525">
                   <a:solidFill>
                     <a:srgbClr val="000000"/>
                   </a:solidFill>
@@ -4651,7 +4651,7 @@
             </a:ln>
             <a:extLst>
               <a:ext uri="{91240B29-F687-4f45-9708-019B960494DF}">
-                <a14:hiddenLine xmlns="" xmlns:a14="http://schemas.microsoft.com/office/drawing/2010/main" w="9525">
+                <a14:hiddenLine xmlns:a14="http://schemas.microsoft.com/office/drawing/2010/main" xmlns="" w="9525">
                   <a:solidFill>
                     <a:srgbClr val="000000"/>
                   </a:solidFill>
@@ -4741,7 +4741,7 @@
             </a:ln>
             <a:extLst>
               <a:ext uri="{91240B29-F687-4f45-9708-019B960494DF}">
-                <a14:hiddenLine xmlns="" xmlns:a14="http://schemas.microsoft.com/office/drawing/2010/main" w="9525">
+                <a14:hiddenLine xmlns:a14="http://schemas.microsoft.com/office/drawing/2010/main" xmlns="" w="9525">
                   <a:solidFill>
                     <a:srgbClr val="000000"/>
                   </a:solidFill>
@@ -4803,7 +4803,7 @@
             </a:ln>
             <a:extLst>
               <a:ext uri="{91240B29-F687-4f45-9708-019B960494DF}">
-                <a14:hiddenLine xmlns="" xmlns:a14="http://schemas.microsoft.com/office/drawing/2010/main" w="9525">
+                <a14:hiddenLine xmlns:a14="http://schemas.microsoft.com/office/drawing/2010/main" xmlns="" w="9525">
                   <a:solidFill>
                     <a:srgbClr val="000000"/>
                   </a:solidFill>
@@ -4865,7 +4865,7 @@
             </a:ln>
             <a:extLst>
               <a:ext uri="{91240B29-F687-4f45-9708-019B960494DF}">
-                <a14:hiddenLine xmlns="" xmlns:a14="http://schemas.microsoft.com/office/drawing/2010/main" w="9525">
+                <a14:hiddenLine xmlns:a14="http://schemas.microsoft.com/office/drawing/2010/main" xmlns="" w="9525">
                   <a:solidFill>
                     <a:srgbClr val="000000"/>
                   </a:solidFill>
@@ -4955,7 +4955,7 @@
             </a:ln>
             <a:extLst>
               <a:ext uri="{91240B29-F687-4f45-9708-019B960494DF}">
-                <a14:hiddenLine xmlns="" xmlns:a14="http://schemas.microsoft.com/office/drawing/2010/main" w="9525">
+                <a14:hiddenLine xmlns:a14="http://schemas.microsoft.com/office/drawing/2010/main" xmlns="" w="9525">
                   <a:solidFill>
                     <a:srgbClr val="000000"/>
                   </a:solidFill>
@@ -5045,7 +5045,7 @@
             </a:ln>
             <a:extLst>
               <a:ext uri="{91240B29-F687-4f45-9708-019B960494DF}">
-                <a14:hiddenLine xmlns="" xmlns:a14="http://schemas.microsoft.com/office/drawing/2010/main" w="9525">
+                <a14:hiddenLine xmlns:a14="http://schemas.microsoft.com/office/drawing/2010/main" xmlns="" w="9525">
                   <a:solidFill>
                     <a:srgbClr val="000000"/>
                   </a:solidFill>
@@ -5107,7 +5107,7 @@
             </a:ln>
             <a:extLst>
               <a:ext uri="{91240B29-F687-4f45-9708-019B960494DF}">
-                <a14:hiddenLine xmlns="" xmlns:a14="http://schemas.microsoft.com/office/drawing/2010/main" w="9525">
+                <a14:hiddenLine xmlns:a14="http://schemas.microsoft.com/office/drawing/2010/main" xmlns="" w="9525">
                   <a:solidFill>
                     <a:srgbClr val="000000"/>
                   </a:solidFill>
@@ -5217,7 +5217,7 @@
             </a:ln>
             <a:extLst>
               <a:ext uri="{91240B29-F687-4f45-9708-019B960494DF}">
-                <a14:hiddenLine xmlns="" xmlns:a14="http://schemas.microsoft.com/office/drawing/2010/main" w="9525">
+                <a14:hiddenLine xmlns:a14="http://schemas.microsoft.com/office/drawing/2010/main" xmlns="" w="9525">
                   <a:solidFill>
                     <a:srgbClr val="000000"/>
                   </a:solidFill>
@@ -5279,7 +5279,7 @@
             </a:ln>
             <a:extLst>
               <a:ext uri="{91240B29-F687-4f45-9708-019B960494DF}">
-                <a14:hiddenLine xmlns="" xmlns:a14="http://schemas.microsoft.com/office/drawing/2010/main" w="9525">
+                <a14:hiddenLine xmlns:a14="http://schemas.microsoft.com/office/drawing/2010/main" xmlns="" w="9525">
                   <a:solidFill>
                     <a:srgbClr val="000000"/>
                   </a:solidFill>
@@ -5369,7 +5369,7 @@
             </a:ln>
             <a:extLst>
               <a:ext uri="{91240B29-F687-4f45-9708-019B960494DF}">
-                <a14:hiddenLine xmlns="" xmlns:a14="http://schemas.microsoft.com/office/drawing/2010/main" w="9525">
+                <a14:hiddenLine xmlns:a14="http://schemas.microsoft.com/office/drawing/2010/main" xmlns="" w="9525">
                   <a:solidFill>
                     <a:srgbClr val="000000"/>
                   </a:solidFill>
@@ -5459,7 +5459,7 @@
             </a:ln>
             <a:extLst>
               <a:ext uri="{91240B29-F687-4f45-9708-019B960494DF}">
-                <a14:hiddenLine xmlns="" xmlns:a14="http://schemas.microsoft.com/office/drawing/2010/main" w="9525">
+                <a14:hiddenLine xmlns:a14="http://schemas.microsoft.com/office/drawing/2010/main" xmlns="" w="9525">
                   <a:solidFill>
                     <a:srgbClr val="000000"/>
                   </a:solidFill>
@@ -5521,7 +5521,7 @@
             </a:ln>
             <a:extLst>
               <a:ext uri="{91240B29-F687-4f45-9708-019B960494DF}">
-                <a14:hiddenLine xmlns="" xmlns:a14="http://schemas.microsoft.com/office/drawing/2010/main" w="9525">
+                <a14:hiddenLine xmlns:a14="http://schemas.microsoft.com/office/drawing/2010/main" xmlns="" w="9525">
                   <a:solidFill>
                     <a:srgbClr val="000000"/>
                   </a:solidFill>
@@ -5611,7 +5611,7 @@
             </a:ln>
             <a:extLst>
               <a:ext uri="{91240B29-F687-4f45-9708-019B960494DF}">
-                <a14:hiddenLine xmlns="" xmlns:a14="http://schemas.microsoft.com/office/drawing/2010/main" w="9525">
+                <a14:hiddenLine xmlns:a14="http://schemas.microsoft.com/office/drawing/2010/main" xmlns="" w="9525">
                   <a:solidFill>
                     <a:srgbClr val="000000"/>
                   </a:solidFill>
@@ -5701,7 +5701,7 @@
             </a:ln>
             <a:extLst>
               <a:ext uri="{91240B29-F687-4f45-9708-019B960494DF}">
-                <a14:hiddenLine xmlns="" xmlns:a14="http://schemas.microsoft.com/office/drawing/2010/main" w="9525">
+                <a14:hiddenLine xmlns:a14="http://schemas.microsoft.com/office/drawing/2010/main" xmlns="" w="9525">
                   <a:solidFill>
                     <a:srgbClr val="000000"/>
                   </a:solidFill>
@@ -5757,7 +5757,7 @@
             </a:ln>
             <a:extLst>
               <a:ext uri="{91240B29-F687-4f45-9708-019B960494DF}">
-                <a14:hiddenLine xmlns="" xmlns:a14="http://schemas.microsoft.com/office/drawing/2010/main" w="9525">
+                <a14:hiddenLine xmlns:a14="http://schemas.microsoft.com/office/drawing/2010/main" xmlns="" w="9525">
                   <a:solidFill>
                     <a:srgbClr val="000000"/>
                   </a:solidFill>
@@ -5847,7 +5847,7 @@
             </a:ln>
             <a:extLst>
               <a:ext uri="{91240B29-F687-4f45-9708-019B960494DF}">
-                <a14:hiddenLine xmlns="" xmlns:a14="http://schemas.microsoft.com/office/drawing/2010/main" w="9525">
+                <a14:hiddenLine xmlns:a14="http://schemas.microsoft.com/office/drawing/2010/main" xmlns="" w="9525">
                   <a:solidFill>
                     <a:srgbClr val="000000"/>
                   </a:solidFill>
@@ -5903,7 +5903,7 @@
             </a:ln>
             <a:extLst>
               <a:ext uri="{91240B29-F687-4f45-9708-019B960494DF}">
-                <a14:hiddenLine xmlns="" xmlns:a14="http://schemas.microsoft.com/office/drawing/2010/main" w="9525">
+                <a14:hiddenLine xmlns:a14="http://schemas.microsoft.com/office/drawing/2010/main" xmlns="" w="9525">
                   <a:solidFill>
                     <a:srgbClr val="000000"/>
                   </a:solidFill>
@@ -5993,7 +5993,7 @@
             </a:ln>
             <a:extLst>
               <a:ext uri="{91240B29-F687-4f45-9708-019B960494DF}">
-                <a14:hiddenLine xmlns="" xmlns:a14="http://schemas.microsoft.com/office/drawing/2010/main" w="9525">
+                <a14:hiddenLine xmlns:a14="http://schemas.microsoft.com/office/drawing/2010/main" xmlns="" w="9525">
                   <a:solidFill>
                     <a:srgbClr val="000000"/>
                   </a:solidFill>
@@ -6061,7 +6061,7 @@
             </a:ln>
             <a:extLst>
               <a:ext uri="{91240B29-F687-4f45-9708-019B960494DF}">
-                <a14:hiddenLine xmlns="" xmlns:a14="http://schemas.microsoft.com/office/drawing/2010/main" w="9525">
+                <a14:hiddenLine xmlns:a14="http://schemas.microsoft.com/office/drawing/2010/main" xmlns="" w="9525">
                   <a:solidFill>
                     <a:srgbClr val="000000"/>
                   </a:solidFill>
@@ -6151,7 +6151,7 @@
             </a:ln>
             <a:extLst>
               <a:ext uri="{91240B29-F687-4f45-9708-019B960494DF}">
-                <a14:hiddenLine xmlns="" xmlns:a14="http://schemas.microsoft.com/office/drawing/2010/main" w="9525">
+                <a14:hiddenLine xmlns:a14="http://schemas.microsoft.com/office/drawing/2010/main" xmlns="" w="9525">
                   <a:solidFill>
                     <a:srgbClr val="000000"/>
                   </a:solidFill>
@@ -6219,7 +6219,7 @@
             </a:ln>
             <a:extLst>
               <a:ext uri="{91240B29-F687-4f45-9708-019B960494DF}">
-                <a14:hiddenLine xmlns="" xmlns:a14="http://schemas.microsoft.com/office/drawing/2010/main" w="9525">
+                <a14:hiddenLine xmlns:a14="http://schemas.microsoft.com/office/drawing/2010/main" xmlns="" w="9525">
                   <a:solidFill>
                     <a:srgbClr val="000000"/>
                   </a:solidFill>
@@ -6309,7 +6309,7 @@
             </a:ln>
             <a:extLst>
               <a:ext uri="{91240B29-F687-4f45-9708-019B960494DF}">
-                <a14:hiddenLine xmlns="" xmlns:a14="http://schemas.microsoft.com/office/drawing/2010/main" w="9525">
+                <a14:hiddenLine xmlns:a14="http://schemas.microsoft.com/office/drawing/2010/main" xmlns="" w="9525">
                   <a:solidFill>
                     <a:srgbClr val="000000"/>
                   </a:solidFill>
@@ -6343,7 +6343,7 @@
             </a:ln>
             <a:extLst>
               <a:ext uri="{91240B29-F687-4f45-9708-019B960494DF}">
-                <a14:hiddenLine xmlns="" xmlns:a14="http://schemas.microsoft.com/office/drawing/2010/main" w="9525">
+                <a14:hiddenLine xmlns:a14="http://schemas.microsoft.com/office/drawing/2010/main" xmlns="" w="9525">
                   <a:solidFill>
                     <a:srgbClr val="000000"/>
                   </a:solidFill>
@@ -6433,7 +6433,7 @@
             </a:ln>
             <a:extLst>
               <a:ext uri="{91240B29-F687-4f45-9708-019B960494DF}">
-                <a14:hiddenLine xmlns="" xmlns:a14="http://schemas.microsoft.com/office/drawing/2010/main" w="9525">
+                <a14:hiddenLine xmlns:a14="http://schemas.microsoft.com/office/drawing/2010/main" xmlns="" w="9525">
                   <a:solidFill>
                     <a:srgbClr val="000000"/>
                   </a:solidFill>
@@ -6495,7 +6495,7 @@
             </a:ln>
             <a:extLst>
               <a:ext uri="{91240B29-F687-4f45-9708-019B960494DF}">
-                <a14:hiddenLine xmlns="" xmlns:a14="http://schemas.microsoft.com/office/drawing/2010/main" w="9525">
+                <a14:hiddenLine xmlns:a14="http://schemas.microsoft.com/office/drawing/2010/main" xmlns="" w="9525">
                   <a:solidFill>
                     <a:srgbClr val="000000"/>
                   </a:solidFill>
@@ -6557,7 +6557,7 @@
             </a:ln>
             <a:extLst>
               <a:ext uri="{91240B29-F687-4f45-9708-019B960494DF}">
-                <a14:hiddenLine xmlns="" xmlns:a14="http://schemas.microsoft.com/office/drawing/2010/main" w="9525">
+                <a14:hiddenLine xmlns:a14="http://schemas.microsoft.com/office/drawing/2010/main" xmlns="" w="9525">
                   <a:solidFill>
                     <a:srgbClr val="000000"/>
                   </a:solidFill>
@@ -6647,7 +6647,7 @@
             </a:ln>
             <a:extLst>
               <a:ext uri="{91240B29-F687-4f45-9708-019B960494DF}">
-                <a14:hiddenLine xmlns="" xmlns:a14="http://schemas.microsoft.com/office/drawing/2010/main" w="9525">
+                <a14:hiddenLine xmlns:a14="http://schemas.microsoft.com/office/drawing/2010/main" xmlns="" w="9525">
                   <a:solidFill>
                     <a:srgbClr val="000000"/>
                   </a:solidFill>
@@ -6715,7 +6715,7 @@
             </a:ln>
             <a:extLst>
               <a:ext uri="{91240B29-F687-4f45-9708-019B960494DF}">
-                <a14:hiddenLine xmlns="" xmlns:a14="http://schemas.microsoft.com/office/drawing/2010/main" w="9525">
+                <a14:hiddenLine xmlns:a14="http://schemas.microsoft.com/office/drawing/2010/main" xmlns="" w="9525">
                   <a:solidFill>
                     <a:srgbClr val="000000"/>
                   </a:solidFill>
@@ -6777,7 +6777,7 @@
             </a:ln>
             <a:extLst>
               <a:ext uri="{91240B29-F687-4f45-9708-019B960494DF}">
-                <a14:hiddenLine xmlns="" xmlns:a14="http://schemas.microsoft.com/office/drawing/2010/main" w="9525">
+                <a14:hiddenLine xmlns:a14="http://schemas.microsoft.com/office/drawing/2010/main" xmlns="" w="9525">
                   <a:solidFill>
                     <a:srgbClr val="000000"/>
                   </a:solidFill>
@@ -6867,7 +6867,7 @@
             </a:ln>
             <a:extLst>
               <a:ext uri="{91240B29-F687-4f45-9708-019B960494DF}">
-                <a14:hiddenLine xmlns="" xmlns:a14="http://schemas.microsoft.com/office/drawing/2010/main" w="9525">
+                <a14:hiddenLine xmlns:a14="http://schemas.microsoft.com/office/drawing/2010/main" xmlns="" w="9525">
                   <a:solidFill>
                     <a:srgbClr val="000000"/>
                   </a:solidFill>
@@ -6929,7 +6929,7 @@
             </a:ln>
             <a:extLst>
               <a:ext uri="{91240B29-F687-4f45-9708-019B960494DF}">
-                <a14:hiddenLine xmlns="" xmlns:a14="http://schemas.microsoft.com/office/drawing/2010/main" w="9525">
+                <a14:hiddenLine xmlns:a14="http://schemas.microsoft.com/office/drawing/2010/main" xmlns="" w="9525">
                   <a:solidFill>
                     <a:srgbClr val="000000"/>
                   </a:solidFill>
@@ -7019,7 +7019,7 @@
             </a:ln>
             <a:extLst>
               <a:ext uri="{91240B29-F687-4f45-9708-019B960494DF}">
-                <a14:hiddenLine xmlns="" xmlns:a14="http://schemas.microsoft.com/office/drawing/2010/main" w="9525">
+                <a14:hiddenLine xmlns:a14="http://schemas.microsoft.com/office/drawing/2010/main" xmlns="" w="9525">
                   <a:solidFill>
                     <a:srgbClr val="000000"/>
                   </a:solidFill>
@@ -7081,7 +7081,7 @@
             </a:ln>
             <a:extLst>
               <a:ext uri="{91240B29-F687-4f45-9708-019B960494DF}">
-                <a14:hiddenLine xmlns="" xmlns:a14="http://schemas.microsoft.com/office/drawing/2010/main" w="9525">
+                <a14:hiddenLine xmlns:a14="http://schemas.microsoft.com/office/drawing/2010/main" xmlns="" w="9525">
                   <a:solidFill>
                     <a:srgbClr val="000000"/>
                   </a:solidFill>
@@ -7171,7 +7171,7 @@
             </a:ln>
             <a:extLst>
               <a:ext uri="{91240B29-F687-4f45-9708-019B960494DF}">
-                <a14:hiddenLine xmlns="" xmlns:a14="http://schemas.microsoft.com/office/drawing/2010/main" w="9525">
+                <a14:hiddenLine xmlns:a14="http://schemas.microsoft.com/office/drawing/2010/main" xmlns="" w="9525">
                   <a:solidFill>
                     <a:srgbClr val="000000"/>
                   </a:solidFill>
@@ -7205,7 +7205,7 @@
             </a:ln>
             <a:extLst>
               <a:ext uri="{91240B29-F687-4f45-9708-019B960494DF}">
-                <a14:hiddenLine xmlns="" xmlns:a14="http://schemas.microsoft.com/office/drawing/2010/main" w="9525">
+                <a14:hiddenLine xmlns:a14="http://schemas.microsoft.com/office/drawing/2010/main" xmlns="" w="9525">
                   <a:solidFill>
                     <a:srgbClr val="000000"/>
                   </a:solidFill>
@@ -7270,7 +7270,7 @@
             </a:ln>
             <a:extLst>
               <a:ext uri="{91240B29-F687-4f45-9708-019B960494DF}">
-                <a14:hiddenLine xmlns="" xmlns:a14="http://schemas.microsoft.com/office/drawing/2010/main" w="9525">
+                <a14:hiddenLine xmlns:a14="http://schemas.microsoft.com/office/drawing/2010/main" xmlns="" w="9525">
                   <a:solidFill>
                     <a:srgbClr val="000000"/>
                   </a:solidFill>
@@ -7360,7 +7360,7 @@
             </a:ln>
             <a:extLst>
               <a:ext uri="{91240B29-F687-4f45-9708-019B960494DF}">
-                <a14:hiddenLine xmlns="" xmlns:a14="http://schemas.microsoft.com/office/drawing/2010/main" w="9525">
+                <a14:hiddenLine xmlns:a14="http://schemas.microsoft.com/office/drawing/2010/main" xmlns="" w="9525">
                   <a:solidFill>
                     <a:srgbClr val="000000"/>
                   </a:solidFill>
@@ -7422,7 +7422,7 @@
             </a:ln>
             <a:extLst>
               <a:ext uri="{91240B29-F687-4f45-9708-019B960494DF}">
-                <a14:hiddenLine xmlns="" xmlns:a14="http://schemas.microsoft.com/office/drawing/2010/main" w="9525">
+                <a14:hiddenLine xmlns:a14="http://schemas.microsoft.com/office/drawing/2010/main" xmlns="" w="9525">
                   <a:solidFill>
                     <a:srgbClr val="000000"/>
                   </a:solidFill>
@@ -7512,7 +7512,7 @@
             </a:ln>
             <a:extLst>
               <a:ext uri="{91240B29-F687-4f45-9708-019B960494DF}">
-                <a14:hiddenLine xmlns="" xmlns:a14="http://schemas.microsoft.com/office/drawing/2010/main" w="9525">
+                <a14:hiddenLine xmlns:a14="http://schemas.microsoft.com/office/drawing/2010/main" xmlns="" w="9525">
                   <a:solidFill>
                     <a:srgbClr val="000000"/>
                   </a:solidFill>
@@ -7602,7 +7602,7 @@
             </a:ln>
             <a:extLst>
               <a:ext uri="{91240B29-F687-4f45-9708-019B960494DF}">
-                <a14:hiddenLine xmlns="" xmlns:a14="http://schemas.microsoft.com/office/drawing/2010/main" w="9525">
+                <a14:hiddenLine xmlns:a14="http://schemas.microsoft.com/office/drawing/2010/main" xmlns="" w="9525">
                   <a:solidFill>
                     <a:srgbClr val="000000"/>
                   </a:solidFill>
@@ -7667,7 +7667,7 @@
             </a:ln>
             <a:extLst>
               <a:ext uri="{91240B29-F687-4f45-9708-019B960494DF}">
-                <a14:hiddenLine xmlns="" xmlns:a14="http://schemas.microsoft.com/office/drawing/2010/main" w="9525">
+                <a14:hiddenLine xmlns:a14="http://schemas.microsoft.com/office/drawing/2010/main" xmlns="" w="9525">
                   <a:solidFill>
                     <a:srgbClr val="000000"/>
                   </a:solidFill>
@@ -7729,7 +7729,7 @@
             </a:ln>
             <a:extLst>
               <a:ext uri="{91240B29-F687-4f45-9708-019B960494DF}">
-                <a14:hiddenLine xmlns="" xmlns:a14="http://schemas.microsoft.com/office/drawing/2010/main" w="9525">
+                <a14:hiddenLine xmlns:a14="http://schemas.microsoft.com/office/drawing/2010/main" xmlns="" w="9525">
                   <a:solidFill>
                     <a:srgbClr val="000000"/>
                   </a:solidFill>
@@ -7819,7 +7819,7 @@
             </a:ln>
             <a:extLst>
               <a:ext uri="{91240B29-F687-4f45-9708-019B960494DF}">
-                <a14:hiddenLine xmlns="" xmlns:a14="http://schemas.microsoft.com/office/drawing/2010/main" w="9525">
+                <a14:hiddenLine xmlns:a14="http://schemas.microsoft.com/office/drawing/2010/main" xmlns="" w="9525">
                   <a:solidFill>
                     <a:srgbClr val="000000"/>
                   </a:solidFill>
@@ -7909,7 +7909,7 @@
             </a:ln>
             <a:extLst>
               <a:ext uri="{91240B29-F687-4f45-9708-019B960494DF}">
-                <a14:hiddenLine xmlns="" xmlns:a14="http://schemas.microsoft.com/office/drawing/2010/main" w="9525">
+                <a14:hiddenLine xmlns:a14="http://schemas.microsoft.com/office/drawing/2010/main" xmlns="" w="9525">
                   <a:solidFill>
                     <a:srgbClr val="000000"/>
                   </a:solidFill>
@@ -7971,7 +7971,7 @@
             </a:ln>
             <a:extLst>
               <a:ext uri="{91240B29-F687-4f45-9708-019B960494DF}">
-                <a14:hiddenLine xmlns="" xmlns:a14="http://schemas.microsoft.com/office/drawing/2010/main" w="9525">
+                <a14:hiddenLine xmlns:a14="http://schemas.microsoft.com/office/drawing/2010/main" xmlns="" w="9525">
                   <a:solidFill>
                     <a:srgbClr val="000000"/>
                   </a:solidFill>
@@ -8091,7 +8091,7 @@
             </a:ln>
             <a:extLst>
               <a:ext uri="{91240B29-F687-4f45-9708-019B960494DF}">
-                <a14:hiddenLine xmlns="" xmlns:a14="http://schemas.microsoft.com/office/drawing/2010/main" w="9525">
+                <a14:hiddenLine xmlns:a14="http://schemas.microsoft.com/office/drawing/2010/main" xmlns="" w="9525">
                   <a:solidFill>
                     <a:srgbClr val="000000"/>
                   </a:solidFill>
@@ -8159,7 +8159,7 @@
             </a:ln>
             <a:extLst>
               <a:ext uri="{91240B29-F687-4f45-9708-019B960494DF}">
-                <a14:hiddenLine xmlns="" xmlns:a14="http://schemas.microsoft.com/office/drawing/2010/main" w="9525">
+                <a14:hiddenLine xmlns:a14="http://schemas.microsoft.com/office/drawing/2010/main" xmlns="" w="9525">
                   <a:solidFill>
                     <a:srgbClr val="000000"/>
                   </a:solidFill>
@@ -8249,7 +8249,7 @@
             </a:ln>
             <a:extLst>
               <a:ext uri="{91240B29-F687-4f45-9708-019B960494DF}">
-                <a14:hiddenLine xmlns="" xmlns:a14="http://schemas.microsoft.com/office/drawing/2010/main" w="9525">
+                <a14:hiddenLine xmlns:a14="http://schemas.microsoft.com/office/drawing/2010/main" xmlns="" w="9525">
                   <a:solidFill>
                     <a:srgbClr val="000000"/>
                   </a:solidFill>
@@ -8389,7 +8389,7 @@
           <a:p>
             <a:fld id="{48A87A34-81AB-432B-8DAE-1953F412C126}" type="datetimeFigureOut">
               <a:rPr lang="en-US" smtClean="0"/>
-              <a:t>1/31/2021</a:t>
+              <a:t>2/22/2021</a:t>
             </a:fld>
             <a:endParaRPr lang="en-US" dirty="0"/>
           </a:p>
@@ -8656,7 +8656,7 @@
           <a:p>
             <a:fld id="{48A87A34-81AB-432B-8DAE-1953F412C126}" type="datetimeFigureOut">
               <a:rPr lang="en-US" smtClean="0"/>
-              <a:t>1/31/2021</a:t>
+              <a:t>2/22/2021</a:t>
             </a:fld>
             <a:endParaRPr lang="en-US" dirty="0"/>
           </a:p>
@@ -8852,7 +8852,7 @@
           <a:p>
             <a:fld id="{48A87A34-81AB-432B-8DAE-1953F412C126}" type="datetimeFigureOut">
               <a:rPr lang="en-US" smtClean="0"/>
-              <a:t>1/31/2021</a:t>
+              <a:t>2/22/2021</a:t>
             </a:fld>
             <a:endParaRPr lang="en-US" dirty="0"/>
           </a:p>
@@ -9115,7 +9115,7 @@
           <a:p>
             <a:fld id="{48A87A34-81AB-432B-8DAE-1953F412C126}" type="datetimeFigureOut">
               <a:rPr lang="en-US" smtClean="0"/>
-              <a:t>1/31/2021</a:t>
+              <a:t>2/22/2021</a:t>
             </a:fld>
             <a:endParaRPr lang="en-US" dirty="0"/>
           </a:p>
@@ -9549,7 +9549,7 @@
           <a:p>
             <a:fld id="{48A87A34-81AB-432B-8DAE-1953F412C126}" type="datetimeFigureOut">
               <a:rPr lang="en-US" smtClean="0"/>
-              <a:t>1/31/2021</a:t>
+              <a:t>2/22/2021</a:t>
             </a:fld>
             <a:endParaRPr lang="en-US" dirty="0"/>
           </a:p>
@@ -10095,7 +10095,7 @@
           <a:p>
             <a:fld id="{48A87A34-81AB-432B-8DAE-1953F412C126}" type="datetimeFigureOut">
               <a:rPr lang="en-US" smtClean="0"/>
-              <a:t>1/31/2021</a:t>
+              <a:t>2/22/2021</a:t>
             </a:fld>
             <a:endParaRPr lang="en-US" dirty="0"/>
           </a:p>
@@ -10815,7 +10815,7 @@
           <a:p>
             <a:fld id="{48A87A34-81AB-432B-8DAE-1953F412C126}" type="datetimeFigureOut">
               <a:rPr lang="en-US" smtClean="0"/>
-              <a:t>1/31/2021</a:t>
+              <a:t>2/22/2021</a:t>
             </a:fld>
             <a:endParaRPr lang="en-US" dirty="0"/>
           </a:p>
@@ -10985,7 +10985,7 @@
           <a:p>
             <a:fld id="{48A87A34-81AB-432B-8DAE-1953F412C126}" type="datetimeFigureOut">
               <a:rPr lang="en-US" smtClean="0"/>
-              <a:t>1/31/2021</a:t>
+              <a:t>2/22/2021</a:t>
             </a:fld>
             <a:endParaRPr lang="en-US" dirty="0"/>
           </a:p>
@@ -11165,7 +11165,7 @@
           <a:p>
             <a:fld id="{48A87A34-81AB-432B-8DAE-1953F412C126}" type="datetimeFigureOut">
               <a:rPr lang="en-US" smtClean="0"/>
-              <a:t>1/31/2021</a:t>
+              <a:t>2/22/2021</a:t>
             </a:fld>
             <a:endParaRPr lang="en-US" dirty="0"/>
           </a:p>
@@ -11335,7 +11335,7 @@
           <a:p>
             <a:fld id="{48A87A34-81AB-432B-8DAE-1953F412C126}" type="datetimeFigureOut">
               <a:rPr lang="en-US" smtClean="0"/>
-              <a:t>1/31/2021</a:t>
+              <a:t>2/22/2021</a:t>
             </a:fld>
             <a:endParaRPr lang="en-US" dirty="0"/>
           </a:p>
@@ -11585,7 +11585,7 @@
           <a:p>
             <a:fld id="{48A87A34-81AB-432B-8DAE-1953F412C126}" type="datetimeFigureOut">
               <a:rPr lang="en-US" smtClean="0"/>
-              <a:t>1/31/2021</a:t>
+              <a:t>2/22/2021</a:t>
             </a:fld>
             <a:endParaRPr lang="en-US" dirty="0"/>
           </a:p>
@@ -11817,7 +11817,7 @@
           <a:p>
             <a:fld id="{48A87A34-81AB-432B-8DAE-1953F412C126}" type="datetimeFigureOut">
               <a:rPr lang="en-US" smtClean="0"/>
-              <a:t>1/31/2021</a:t>
+              <a:t>2/22/2021</a:t>
             </a:fld>
             <a:endParaRPr lang="en-US" dirty="0"/>
           </a:p>
@@ -12198,7 +12198,7 @@
           <a:p>
             <a:fld id="{48A87A34-81AB-432B-8DAE-1953F412C126}" type="datetimeFigureOut">
               <a:rPr lang="en-US" smtClean="0"/>
-              <a:t>1/31/2021</a:t>
+              <a:t>2/22/2021</a:t>
             </a:fld>
             <a:endParaRPr lang="en-US" dirty="0"/>
           </a:p>
@@ -12316,7 +12316,7 @@
           <a:p>
             <a:fld id="{48A87A34-81AB-432B-8DAE-1953F412C126}" type="datetimeFigureOut">
               <a:rPr lang="en-US" smtClean="0"/>
-              <a:t>1/31/2021</a:t>
+              <a:t>2/22/2021</a:t>
             </a:fld>
             <a:endParaRPr lang="en-US" dirty="0"/>
           </a:p>
@@ -12411,7 +12411,7 @@
           <a:p>
             <a:fld id="{48A87A34-81AB-432B-8DAE-1953F412C126}" type="datetimeFigureOut">
               <a:rPr lang="en-US" smtClean="0"/>
-              <a:t>1/31/2021</a:t>
+              <a:t>2/22/2021</a:t>
             </a:fld>
             <a:endParaRPr lang="en-US" dirty="0"/>
           </a:p>
@@ -12660,7 +12660,7 @@
           <a:p>
             <a:fld id="{48A87A34-81AB-432B-8DAE-1953F412C126}" type="datetimeFigureOut">
               <a:rPr lang="en-US" smtClean="0"/>
-              <a:t>1/31/2021</a:t>
+              <a:t>2/22/2021</a:t>
             </a:fld>
             <a:endParaRPr lang="en-US" dirty="0"/>
           </a:p>
@@ -12940,7 +12940,7 @@
           <a:p>
             <a:fld id="{48A87A34-81AB-432B-8DAE-1953F412C126}" type="datetimeFigureOut">
               <a:rPr lang="en-US" smtClean="0"/>
-              <a:t>1/31/2021</a:t>
+              <a:t>2/22/2021</a:t>
             </a:fld>
             <a:endParaRPr lang="en-US" dirty="0"/>
           </a:p>
@@ -13063,7 +13063,7 @@
           <a:noFill/>
           <a:extLst>
             <a:ext uri="{909E8E84-426E-40dd-AFC4-6F175D3DCCD1}">
-              <a14:hiddenFill xmlns="" xmlns:a14="http://schemas.microsoft.com/office/drawing/2010/main">
+              <a14:hiddenFill xmlns:a14="http://schemas.microsoft.com/office/drawing/2010/main" xmlns="">
                 <a:solidFill>
                   <a:srgbClr val="FFFFFF"/>
                 </a:solidFill>
@@ -13137,7 +13137,7 @@
               </a:ln>
               <a:extLst>
                 <a:ext uri="{91240B29-F687-4f45-9708-019B960494DF}">
-                  <a14:hiddenLine xmlns="" xmlns:a14="http://schemas.microsoft.com/office/drawing/2010/main" w="9525">
+                  <a14:hiddenLine xmlns:a14="http://schemas.microsoft.com/office/drawing/2010/main" xmlns="" w="9525">
                     <a:solidFill>
                       <a:srgbClr val="000000"/>
                     </a:solidFill>
@@ -13227,7 +13227,7 @@
               </a:ln>
               <a:extLst>
                 <a:ext uri="{91240B29-F687-4f45-9708-019B960494DF}">
-                  <a14:hiddenLine xmlns="" xmlns:a14="http://schemas.microsoft.com/office/drawing/2010/main" w="9525">
+                  <a14:hiddenLine xmlns:a14="http://schemas.microsoft.com/office/drawing/2010/main" xmlns="" w="9525">
                     <a:solidFill>
                       <a:srgbClr val="000000"/>
                     </a:solidFill>
@@ -13317,7 +13317,7 @@
               </a:ln>
               <a:extLst>
                 <a:ext uri="{91240B29-F687-4f45-9708-019B960494DF}">
-                  <a14:hiddenLine xmlns="" xmlns:a14="http://schemas.microsoft.com/office/drawing/2010/main" w="9525">
+                  <a14:hiddenLine xmlns:a14="http://schemas.microsoft.com/office/drawing/2010/main" xmlns="" w="9525">
                     <a:solidFill>
                       <a:srgbClr val="000000"/>
                     </a:solidFill>
@@ -13379,7 +13379,7 @@
               </a:ln>
               <a:extLst>
                 <a:ext uri="{91240B29-F687-4f45-9708-019B960494DF}">
-                  <a14:hiddenLine xmlns="" xmlns:a14="http://schemas.microsoft.com/office/drawing/2010/main" w="9525">
+                  <a14:hiddenLine xmlns:a14="http://schemas.microsoft.com/office/drawing/2010/main" xmlns="" w="9525">
                     <a:solidFill>
                       <a:srgbClr val="000000"/>
                     </a:solidFill>
@@ -13469,7 +13469,7 @@
               </a:ln>
               <a:extLst>
                 <a:ext uri="{91240B29-F687-4f45-9708-019B960494DF}">
-                  <a14:hiddenLine xmlns="" xmlns:a14="http://schemas.microsoft.com/office/drawing/2010/main" w="9525">
+                  <a14:hiddenLine xmlns:a14="http://schemas.microsoft.com/office/drawing/2010/main" xmlns="" w="9525">
                     <a:solidFill>
                       <a:srgbClr val="000000"/>
                     </a:solidFill>
@@ -13531,7 +13531,7 @@
               </a:ln>
               <a:extLst>
                 <a:ext uri="{91240B29-F687-4f45-9708-019B960494DF}">
-                  <a14:hiddenLine xmlns="" xmlns:a14="http://schemas.microsoft.com/office/drawing/2010/main" w="9525">
+                  <a14:hiddenLine xmlns:a14="http://schemas.microsoft.com/office/drawing/2010/main" xmlns="" w="9525">
                     <a:solidFill>
                       <a:srgbClr val="000000"/>
                     </a:solidFill>
@@ -13593,7 +13593,7 @@
               </a:ln>
               <a:extLst>
                 <a:ext uri="{91240B29-F687-4f45-9708-019B960494DF}">
-                  <a14:hiddenLine xmlns="" xmlns:a14="http://schemas.microsoft.com/office/drawing/2010/main" w="9525">
+                  <a14:hiddenLine xmlns:a14="http://schemas.microsoft.com/office/drawing/2010/main" xmlns="" w="9525">
                     <a:solidFill>
                       <a:srgbClr val="000000"/>
                     </a:solidFill>
@@ -13683,7 +13683,7 @@
               </a:ln>
               <a:extLst>
                 <a:ext uri="{91240B29-F687-4f45-9708-019B960494DF}">
-                  <a14:hiddenLine xmlns="" xmlns:a14="http://schemas.microsoft.com/office/drawing/2010/main" w="9525">
+                  <a14:hiddenLine xmlns:a14="http://schemas.microsoft.com/office/drawing/2010/main" xmlns="" w="9525">
                     <a:solidFill>
                       <a:srgbClr val="000000"/>
                     </a:solidFill>
@@ -13773,7 +13773,7 @@
               </a:ln>
               <a:extLst>
                 <a:ext uri="{91240B29-F687-4f45-9708-019B960494DF}">
-                  <a14:hiddenLine xmlns="" xmlns:a14="http://schemas.microsoft.com/office/drawing/2010/main" w="9525">
+                  <a14:hiddenLine xmlns:a14="http://schemas.microsoft.com/office/drawing/2010/main" xmlns="" w="9525">
                     <a:solidFill>
                       <a:srgbClr val="000000"/>
                     </a:solidFill>
@@ -13835,7 +13835,7 @@
               </a:ln>
               <a:extLst>
                 <a:ext uri="{91240B29-F687-4f45-9708-019B960494DF}">
-                  <a14:hiddenLine xmlns="" xmlns:a14="http://schemas.microsoft.com/office/drawing/2010/main" w="9525">
+                  <a14:hiddenLine xmlns:a14="http://schemas.microsoft.com/office/drawing/2010/main" xmlns="" w="9525">
                     <a:solidFill>
                       <a:srgbClr val="000000"/>
                     </a:solidFill>
@@ -13945,7 +13945,7 @@
               </a:ln>
               <a:extLst>
                 <a:ext uri="{91240B29-F687-4f45-9708-019B960494DF}">
-                  <a14:hiddenLine xmlns="" xmlns:a14="http://schemas.microsoft.com/office/drawing/2010/main" w="9525">
+                  <a14:hiddenLine xmlns:a14="http://schemas.microsoft.com/office/drawing/2010/main" xmlns="" w="9525">
                     <a:solidFill>
                       <a:srgbClr val="000000"/>
                     </a:solidFill>
@@ -14029,7 +14029,7 @@
               </a:ln>
               <a:extLst>
                 <a:ext uri="{91240B29-F687-4f45-9708-019B960494DF}">
-                  <a14:hiddenLine xmlns="" xmlns:a14="http://schemas.microsoft.com/office/drawing/2010/main" w="9525">
+                  <a14:hiddenLine xmlns:a14="http://schemas.microsoft.com/office/drawing/2010/main" xmlns="" w="9525">
                     <a:solidFill>
                       <a:srgbClr val="000000"/>
                     </a:solidFill>
@@ -14091,7 +14091,7 @@
               </a:ln>
               <a:extLst>
                 <a:ext uri="{91240B29-F687-4f45-9708-019B960494DF}">
-                  <a14:hiddenLine xmlns="" xmlns:a14="http://schemas.microsoft.com/office/drawing/2010/main" w="9525">
+                  <a14:hiddenLine xmlns:a14="http://schemas.microsoft.com/office/drawing/2010/main" xmlns="" w="9525">
                     <a:solidFill>
                       <a:srgbClr val="000000"/>
                     </a:solidFill>
@@ -14153,7 +14153,7 @@
               </a:ln>
               <a:extLst>
                 <a:ext uri="{91240B29-F687-4f45-9708-019B960494DF}">
-                  <a14:hiddenLine xmlns="" xmlns:a14="http://schemas.microsoft.com/office/drawing/2010/main" w="9525">
+                  <a14:hiddenLine xmlns:a14="http://schemas.microsoft.com/office/drawing/2010/main" xmlns="" w="9525">
                     <a:solidFill>
                       <a:srgbClr val="000000"/>
                     </a:solidFill>
@@ -14243,7 +14243,7 @@
               </a:ln>
               <a:extLst>
                 <a:ext uri="{91240B29-F687-4f45-9708-019B960494DF}">
-                  <a14:hiddenLine xmlns="" xmlns:a14="http://schemas.microsoft.com/office/drawing/2010/main" w="9525">
+                  <a14:hiddenLine xmlns:a14="http://schemas.microsoft.com/office/drawing/2010/main" xmlns="" w="9525">
                     <a:solidFill>
                       <a:srgbClr val="000000"/>
                     </a:solidFill>
@@ -14277,7 +14277,7 @@
               </a:ln>
               <a:extLst>
                 <a:ext uri="{91240B29-F687-4f45-9708-019B960494DF}">
-                  <a14:hiddenLine xmlns="" xmlns:a14="http://schemas.microsoft.com/office/drawing/2010/main" w="9525">
+                  <a14:hiddenLine xmlns:a14="http://schemas.microsoft.com/office/drawing/2010/main" xmlns="" w="9525">
                     <a:solidFill>
                       <a:srgbClr val="000000"/>
                     </a:solidFill>
@@ -14342,7 +14342,7 @@
               </a:ln>
               <a:extLst>
                 <a:ext uri="{91240B29-F687-4f45-9708-019B960494DF}">
-                  <a14:hiddenLine xmlns="" xmlns:a14="http://schemas.microsoft.com/office/drawing/2010/main" w="9525">
+                  <a14:hiddenLine xmlns:a14="http://schemas.microsoft.com/office/drawing/2010/main" xmlns="" w="9525">
                     <a:solidFill>
                       <a:srgbClr val="000000"/>
                     </a:solidFill>
@@ -14432,7 +14432,7 @@
               </a:ln>
               <a:extLst>
                 <a:ext uri="{91240B29-F687-4f45-9708-019B960494DF}">
-                  <a14:hiddenLine xmlns="" xmlns:a14="http://schemas.microsoft.com/office/drawing/2010/main" w="9525">
+                  <a14:hiddenLine xmlns:a14="http://schemas.microsoft.com/office/drawing/2010/main" xmlns="" w="9525">
                     <a:solidFill>
                       <a:srgbClr val="000000"/>
                     </a:solidFill>
@@ -14494,7 +14494,7 @@
               </a:ln>
               <a:extLst>
                 <a:ext uri="{91240B29-F687-4f45-9708-019B960494DF}">
-                  <a14:hiddenLine xmlns="" xmlns:a14="http://schemas.microsoft.com/office/drawing/2010/main" w="9525">
+                  <a14:hiddenLine xmlns:a14="http://schemas.microsoft.com/office/drawing/2010/main" xmlns="" w="9525">
                     <a:solidFill>
                       <a:srgbClr val="000000"/>
                     </a:solidFill>
@@ -14584,7 +14584,7 @@
               </a:ln>
               <a:extLst>
                 <a:ext uri="{91240B29-F687-4f45-9708-019B960494DF}">
-                  <a14:hiddenLine xmlns="" xmlns:a14="http://schemas.microsoft.com/office/drawing/2010/main" w="9525">
+                  <a14:hiddenLine xmlns:a14="http://schemas.microsoft.com/office/drawing/2010/main" xmlns="" w="9525">
                     <a:solidFill>
                       <a:srgbClr val="000000"/>
                     </a:solidFill>
@@ -14649,7 +14649,7 @@
               </a:ln>
               <a:extLst>
                 <a:ext uri="{91240B29-F687-4f45-9708-019B960494DF}">
-                  <a14:hiddenLine xmlns="" xmlns:a14="http://schemas.microsoft.com/office/drawing/2010/main" w="9525">
+                  <a14:hiddenLine xmlns:a14="http://schemas.microsoft.com/office/drawing/2010/main" xmlns="" w="9525">
                     <a:solidFill>
                       <a:srgbClr val="000000"/>
                     </a:solidFill>
@@ -14711,7 +14711,7 @@
               </a:ln>
               <a:extLst>
                 <a:ext uri="{91240B29-F687-4f45-9708-019B960494DF}">
-                  <a14:hiddenLine xmlns="" xmlns:a14="http://schemas.microsoft.com/office/drawing/2010/main" w="9525">
+                  <a14:hiddenLine xmlns:a14="http://schemas.microsoft.com/office/drawing/2010/main" xmlns="" w="9525">
                     <a:solidFill>
                       <a:srgbClr val="000000"/>
                     </a:solidFill>
@@ -14801,7 +14801,7 @@
               </a:ln>
               <a:extLst>
                 <a:ext uri="{91240B29-F687-4f45-9708-019B960494DF}">
-                  <a14:hiddenLine xmlns="" xmlns:a14="http://schemas.microsoft.com/office/drawing/2010/main" w="9525">
+                  <a14:hiddenLine xmlns:a14="http://schemas.microsoft.com/office/drawing/2010/main" xmlns="" w="9525">
                     <a:solidFill>
                       <a:srgbClr val="000000"/>
                     </a:solidFill>
@@ -14891,7 +14891,7 @@
               </a:ln>
               <a:extLst>
                 <a:ext uri="{91240B29-F687-4f45-9708-019B960494DF}">
-                  <a14:hiddenLine xmlns="" xmlns:a14="http://schemas.microsoft.com/office/drawing/2010/main" w="9525">
+                  <a14:hiddenLine xmlns:a14="http://schemas.microsoft.com/office/drawing/2010/main" xmlns="" w="9525">
                     <a:solidFill>
                       <a:srgbClr val="000000"/>
                     </a:solidFill>
@@ -14956,7 +14956,7 @@
               </a:ln>
               <a:extLst>
                 <a:ext uri="{91240B29-F687-4f45-9708-019B960494DF}">
-                  <a14:hiddenLine xmlns="" xmlns:a14="http://schemas.microsoft.com/office/drawing/2010/main" w="9525">
+                  <a14:hiddenLine xmlns:a14="http://schemas.microsoft.com/office/drawing/2010/main" xmlns="" w="9525">
                     <a:solidFill>
                       <a:srgbClr val="000000"/>
                     </a:solidFill>
@@ -15076,7 +15076,7 @@
               </a:ln>
               <a:extLst>
                 <a:ext uri="{91240B29-F687-4f45-9708-019B960494DF}">
-                  <a14:hiddenLine xmlns="" xmlns:a14="http://schemas.microsoft.com/office/drawing/2010/main" w="9525">
+                  <a14:hiddenLine xmlns:a14="http://schemas.microsoft.com/office/drawing/2010/main" xmlns="" w="9525">
                     <a:solidFill>
                       <a:srgbClr val="000000"/>
                     </a:solidFill>
@@ -15157,7 +15157,7 @@
               </a:ln>
               <a:extLst>
                 <a:ext uri="{91240B29-F687-4f45-9708-019B960494DF}">
-                  <a14:hiddenLine xmlns="" xmlns:a14="http://schemas.microsoft.com/office/drawing/2010/main" w="9525">
+                  <a14:hiddenLine xmlns:a14="http://schemas.microsoft.com/office/drawing/2010/main" xmlns="" w="9525">
                     <a:solidFill>
                       <a:srgbClr val="000000"/>
                     </a:solidFill>
@@ -15272,7 +15272,7 @@
               </a:ln>
               <a:extLst>
                 <a:ext uri="{91240B29-F687-4f45-9708-019B960494DF}">
-                  <a14:hiddenLine xmlns="" xmlns:a14="http://schemas.microsoft.com/office/drawing/2010/main" w="9525">
+                  <a14:hiddenLine xmlns:a14="http://schemas.microsoft.com/office/drawing/2010/main" xmlns="" w="9525">
                     <a:solidFill>
                       <a:srgbClr val="000000"/>
                     </a:solidFill>
@@ -15362,7 +15362,7 @@
               </a:ln>
               <a:extLst>
                 <a:ext uri="{91240B29-F687-4f45-9708-019B960494DF}">
-                  <a14:hiddenLine xmlns="" xmlns:a14="http://schemas.microsoft.com/office/drawing/2010/main" w="9525">
+                  <a14:hiddenLine xmlns:a14="http://schemas.microsoft.com/office/drawing/2010/main" xmlns="" w="9525">
                     <a:solidFill>
                       <a:srgbClr val="000000"/>
                     </a:solidFill>
@@ -15427,7 +15427,7 @@
               </a:ln>
               <a:extLst>
                 <a:ext uri="{91240B29-F687-4f45-9708-019B960494DF}">
-                  <a14:hiddenLine xmlns="" xmlns:a14="http://schemas.microsoft.com/office/drawing/2010/main" w="9525">
+                  <a14:hiddenLine xmlns:a14="http://schemas.microsoft.com/office/drawing/2010/main" xmlns="" w="9525">
                     <a:solidFill>
                       <a:srgbClr val="000000"/>
                     </a:solidFill>
@@ -15517,7 +15517,7 @@
               </a:ln>
               <a:extLst>
                 <a:ext uri="{91240B29-F687-4f45-9708-019B960494DF}">
-                  <a14:hiddenLine xmlns="" xmlns:a14="http://schemas.microsoft.com/office/drawing/2010/main" w="9525">
+                  <a14:hiddenLine xmlns:a14="http://schemas.microsoft.com/office/drawing/2010/main" xmlns="" w="9525">
                     <a:solidFill>
                       <a:srgbClr val="000000"/>
                     </a:solidFill>
@@ -15585,7 +15585,7 @@
               </a:ln>
               <a:extLst>
                 <a:ext uri="{91240B29-F687-4f45-9708-019B960494DF}">
-                  <a14:hiddenLine xmlns="" xmlns:a14="http://schemas.microsoft.com/office/drawing/2010/main" w="9525">
+                  <a14:hiddenLine xmlns:a14="http://schemas.microsoft.com/office/drawing/2010/main" xmlns="" w="9525">
                     <a:solidFill>
                       <a:srgbClr val="000000"/>
                     </a:solidFill>
@@ -15675,7 +15675,7 @@
               </a:ln>
               <a:extLst>
                 <a:ext uri="{91240B29-F687-4f45-9708-019B960494DF}">
-                  <a14:hiddenLine xmlns="" xmlns:a14="http://schemas.microsoft.com/office/drawing/2010/main" w="9525">
+                  <a14:hiddenLine xmlns:a14="http://schemas.microsoft.com/office/drawing/2010/main" xmlns="" w="9525">
                     <a:solidFill>
                       <a:srgbClr val="000000"/>
                     </a:solidFill>
@@ -15743,7 +15743,7 @@
               </a:ln>
               <a:extLst>
                 <a:ext uri="{91240B29-F687-4f45-9708-019B960494DF}">
-                  <a14:hiddenLine xmlns="" xmlns:a14="http://schemas.microsoft.com/office/drawing/2010/main" w="9525">
+                  <a14:hiddenLine xmlns:a14="http://schemas.microsoft.com/office/drawing/2010/main" xmlns="" w="9525">
                     <a:solidFill>
                       <a:srgbClr val="000000"/>
                     </a:solidFill>
@@ -15833,7 +15833,7 @@
               </a:ln>
               <a:extLst>
                 <a:ext uri="{91240B29-F687-4f45-9708-019B960494DF}">
-                  <a14:hiddenLine xmlns="" xmlns:a14="http://schemas.microsoft.com/office/drawing/2010/main" w="9525">
+                  <a14:hiddenLine xmlns:a14="http://schemas.microsoft.com/office/drawing/2010/main" xmlns="" w="9525">
                     <a:solidFill>
                       <a:srgbClr val="000000"/>
                     </a:solidFill>
@@ -15867,7 +15867,7 @@
               </a:ln>
               <a:extLst>
                 <a:ext uri="{91240B29-F687-4f45-9708-019B960494DF}">
-                  <a14:hiddenLine xmlns="" xmlns:a14="http://schemas.microsoft.com/office/drawing/2010/main" w="9525">
+                  <a14:hiddenLine xmlns:a14="http://schemas.microsoft.com/office/drawing/2010/main" xmlns="" w="9525">
                     <a:solidFill>
                       <a:srgbClr val="000000"/>
                     </a:solidFill>
@@ -16008,7 +16008,7 @@
             <a:fld id="{48A87A34-81AB-432B-8DAE-1953F412C126}" type="datetimeFigureOut">
               <a:rPr lang="en-US" smtClean="0"/>
               <a:pPr/>
-              <a:t>1/31/2021</a:t>
+              <a:t>2/22/2021</a:t>
             </a:fld>
             <a:endParaRPr lang="en-US" dirty="0"/>
           </a:p>
@@ -16550,7 +16550,7 @@
                 <a16:creationId xmlns:a16="http://schemas.microsoft.com/office/drawing/2014/main" id="{8D4F1745-A55E-4835-88EB-BC637121B608}"/>
               </a:ext>
               <a:ext uri="{C183D7F6-B498-43B3-948B-1728B52AA6E4}">
-                <adec:decorative xmlns:adec="http://schemas.microsoft.com/office/drawing/2017/decorative" xmlns="" val="1"/>
+                <adec:decorative xmlns="" xmlns:adec="http://schemas.microsoft.com/office/drawing/2017/decorative" val="1"/>
               </a:ext>
             </a:extLst>
           </p:cNvPr>
@@ -16676,7 +16676,39 @@
                 <a:ea typeface="Tahoma" panose="020B0604030504040204" pitchFamily="34" charset="0"/>
                 <a:cs typeface="Tahoma" panose="020B0604030504040204" pitchFamily="34" charset="0"/>
               </a:rPr>
-              <a:t>Учениците поличават задачи</a:t>
+              <a:t>Учениците </a:t>
+            </a:r>
+            <a:r>
+              <a:rPr lang="bg-BG" dirty="0" smtClean="0">
+                <a:latin typeface="Tahoma" panose="020B0604030504040204" pitchFamily="34" charset="0"/>
+                <a:ea typeface="Tahoma" panose="020B0604030504040204" pitchFamily="34" charset="0"/>
+                <a:cs typeface="Tahoma" panose="020B0604030504040204" pitchFamily="34" charset="0"/>
+              </a:rPr>
+              <a:t>пол</a:t>
+            </a:r>
+            <a:r>
+              <a:rPr lang="bg-BG" dirty="0">
+                <a:latin typeface="Tahoma" panose="020B0604030504040204" pitchFamily="34" charset="0"/>
+                <a:ea typeface="Tahoma" panose="020B0604030504040204" pitchFamily="34" charset="0"/>
+                <a:cs typeface="Tahoma" panose="020B0604030504040204" pitchFamily="34" charset="0"/>
+              </a:rPr>
+              <a:t>у</a:t>
+            </a:r>
+            <a:r>
+              <a:rPr lang="bg-BG" dirty="0" smtClean="0">
+                <a:latin typeface="Tahoma" panose="020B0604030504040204" pitchFamily="34" charset="0"/>
+                <a:ea typeface="Tahoma" panose="020B0604030504040204" pitchFamily="34" charset="0"/>
+                <a:cs typeface="Tahoma" panose="020B0604030504040204" pitchFamily="34" charset="0"/>
+              </a:rPr>
+              <a:t>чават </a:t>
+            </a:r>
+            <a:r>
+              <a:rPr lang="bg-BG" dirty="0" smtClean="0">
+                <a:latin typeface="Tahoma" panose="020B0604030504040204" pitchFamily="34" charset="0"/>
+                <a:ea typeface="Tahoma" panose="020B0604030504040204" pitchFamily="34" charset="0"/>
+                <a:cs typeface="Tahoma" panose="020B0604030504040204" pitchFamily="34" charset="0"/>
+              </a:rPr>
+              <a:t>задачи</a:t>
             </a:r>
             <a:r>
               <a:rPr lang="bg-BG" dirty="0">
@@ -16700,8 +16732,37 @@
                 <a:ea typeface="Tahoma" panose="020B0604030504040204" pitchFamily="34" charset="0"/>
                 <a:cs typeface="Tahoma" panose="020B0604030504040204" pitchFamily="34" charset="0"/>
               </a:rPr>
-              <a:t>Опитват се да решат задачите, но дали решението им е вярно?</a:t>
+              <a:t>Опитват се да решат задачите, но дали </a:t>
             </a:r>
+            <a:r>
+              <a:rPr lang="bg-BG" dirty="0" smtClean="0">
+                <a:latin typeface="Tahoma" panose="020B0604030504040204" pitchFamily="34" charset="0"/>
+                <a:ea typeface="Tahoma" panose="020B0604030504040204" pitchFamily="34" charset="0"/>
+                <a:cs typeface="Tahoma" panose="020B0604030504040204" pitchFamily="34" charset="0"/>
+              </a:rPr>
+              <a:t>решенията </a:t>
+            </a:r>
+            <a:r>
+              <a:rPr lang="bg-BG" dirty="0" smtClean="0">
+                <a:latin typeface="Tahoma" panose="020B0604030504040204" pitchFamily="34" charset="0"/>
+                <a:ea typeface="Tahoma" panose="020B0604030504040204" pitchFamily="34" charset="0"/>
+                <a:cs typeface="Tahoma" panose="020B0604030504040204" pitchFamily="34" charset="0"/>
+              </a:rPr>
+              <a:t>им е </a:t>
+            </a:r>
+            <a:r>
+              <a:rPr lang="bg-BG" dirty="0" smtClean="0">
+                <a:latin typeface="Tahoma" panose="020B0604030504040204" pitchFamily="34" charset="0"/>
+                <a:ea typeface="Tahoma" panose="020B0604030504040204" pitchFamily="34" charset="0"/>
+                <a:cs typeface="Tahoma" panose="020B0604030504040204" pitchFamily="34" charset="0"/>
+              </a:rPr>
+              <a:t>верни?</a:t>
+            </a:r>
+            <a:endParaRPr lang="bg-BG" dirty="0" smtClean="0">
+              <a:latin typeface="Tahoma" panose="020B0604030504040204" pitchFamily="34" charset="0"/>
+              <a:ea typeface="Tahoma" panose="020B0604030504040204" pitchFamily="34" charset="0"/>
+              <a:cs typeface="Tahoma" panose="020B0604030504040204" pitchFamily="34" charset="0"/>
+            </a:endParaRPr>
           </a:p>
           <a:p>
             <a:pPr lvl="1"/>
@@ -16711,8 +16772,21 @@
                 <a:ea typeface="Tahoma" panose="020B0604030504040204" pitchFamily="34" charset="0"/>
                 <a:cs typeface="Tahoma" panose="020B0604030504040204" pitchFamily="34" charset="0"/>
               </a:rPr>
-              <a:t>Проверяват ръчно с няколко примерни входа</a:t>
+              <a:t>Проверяват ръчно с няколко примерни </a:t>
             </a:r>
+            <a:r>
+              <a:rPr lang="bg-BG" dirty="0" smtClean="0">
+                <a:latin typeface="Tahoma" panose="020B0604030504040204" pitchFamily="34" charset="0"/>
+                <a:ea typeface="Tahoma" panose="020B0604030504040204" pitchFamily="34" charset="0"/>
+                <a:cs typeface="Tahoma" panose="020B0604030504040204" pitchFamily="34" charset="0"/>
+              </a:rPr>
+              <a:t>входа.</a:t>
+            </a:r>
+            <a:endParaRPr lang="bg-BG" dirty="0" smtClean="0">
+              <a:latin typeface="Tahoma" panose="020B0604030504040204" pitchFamily="34" charset="0"/>
+              <a:ea typeface="Tahoma" panose="020B0604030504040204" pitchFamily="34" charset="0"/>
+              <a:cs typeface="Tahoma" panose="020B0604030504040204" pitchFamily="34" charset="0"/>
+            </a:endParaRPr>
           </a:p>
           <a:p>
             <a:pPr lvl="1"/>
@@ -16722,8 +16796,21 @@
                 <a:ea typeface="Tahoma" panose="020B0604030504040204" pitchFamily="34" charset="0"/>
                 <a:cs typeface="Tahoma" panose="020B0604030504040204" pitchFamily="34" charset="0"/>
               </a:rPr>
-              <a:t>След като решат задачата може да предадат кода на учителя</a:t>
+              <a:t>След като решат задачата може да предадат кода на </a:t>
             </a:r>
+            <a:r>
+              <a:rPr lang="bg-BG" dirty="0" smtClean="0">
+                <a:latin typeface="Tahoma" panose="020B0604030504040204" pitchFamily="34" charset="0"/>
+                <a:ea typeface="Tahoma" panose="020B0604030504040204" pitchFamily="34" charset="0"/>
+                <a:cs typeface="Tahoma" panose="020B0604030504040204" pitchFamily="34" charset="0"/>
+              </a:rPr>
+              <a:t>учителя.</a:t>
+            </a:r>
+            <a:endParaRPr lang="bg-BG" dirty="0" smtClean="0">
+              <a:latin typeface="Tahoma" panose="020B0604030504040204" pitchFamily="34" charset="0"/>
+              <a:ea typeface="Tahoma" panose="020B0604030504040204" pitchFamily="34" charset="0"/>
+              <a:cs typeface="Tahoma" panose="020B0604030504040204" pitchFamily="34" charset="0"/>
+            </a:endParaRPr>
           </a:p>
           <a:p>
             <a:pPr lvl="1"/>
@@ -16733,8 +16820,21 @@
                 <a:ea typeface="Tahoma" panose="020B0604030504040204" pitchFamily="34" charset="0"/>
                 <a:cs typeface="Tahoma" panose="020B0604030504040204" pitchFamily="34" charset="0"/>
               </a:rPr>
-              <a:t>Учителя поверява стотици решение на ръка</a:t>
+              <a:t>Учителя поверява стотици решение на </a:t>
             </a:r>
+            <a:r>
+              <a:rPr lang="bg-BG" dirty="0" smtClean="0">
+                <a:latin typeface="Tahoma" panose="020B0604030504040204" pitchFamily="34" charset="0"/>
+                <a:ea typeface="Tahoma" panose="020B0604030504040204" pitchFamily="34" charset="0"/>
+                <a:cs typeface="Tahoma" panose="020B0604030504040204" pitchFamily="34" charset="0"/>
+              </a:rPr>
+              <a:t>ръка.</a:t>
+            </a:r>
+            <a:endParaRPr lang="bg-BG" dirty="0" smtClean="0">
+              <a:latin typeface="Tahoma" panose="020B0604030504040204" pitchFamily="34" charset="0"/>
+              <a:ea typeface="Tahoma" panose="020B0604030504040204" pitchFamily="34" charset="0"/>
+              <a:cs typeface="Tahoma" panose="020B0604030504040204" pitchFamily="34" charset="0"/>
+            </a:endParaRPr>
           </a:p>
           <a:p>
             <a:pPr lvl="1"/>
@@ -16747,20 +16847,12 @@
               <a:t>Нужно е този процес да се подобри </a:t>
             </a:r>
             <a:r>
-              <a:rPr lang="bg-BG" dirty="0" err="1" smtClean="0">
+              <a:rPr lang="bg-BG" dirty="0" smtClean="0">
                 <a:latin typeface="Tahoma" panose="020B0604030504040204" pitchFamily="34" charset="0"/>
                 <a:ea typeface="Tahoma" panose="020B0604030504040204" pitchFamily="34" charset="0"/>
                 <a:cs typeface="Tahoma" panose="020B0604030504040204" pitchFamily="34" charset="0"/>
               </a:rPr>
-              <a:t>занчите</a:t>
-            </a:r>
-            <a:r>
-              <a:rPr lang="bg-BG" dirty="0" err="1" smtClean="0">
-                <a:latin typeface="Tahoma" panose="020B0604030504040204" pitchFamily="34" charset="0"/>
-                <a:ea typeface="Tahoma" panose="020B0604030504040204" pitchFamily="34" charset="0"/>
-                <a:cs typeface="Tahoma" panose="020B0604030504040204" pitchFamily="34" charset="0"/>
-              </a:rPr>
-              <a:t>лно</a:t>
+              <a:t>значително.</a:t>
             </a:r>
             <a:endParaRPr lang="bg-BG" dirty="0">
               <a:latin typeface="Tahoma" panose="020B0604030504040204" pitchFamily="34" charset="0"/>
@@ -16882,8 +16974,21 @@
                 <a:ea typeface="Tahoma" panose="020B0604030504040204" pitchFamily="34" charset="0"/>
                 <a:cs typeface="Tahoma" panose="020B0604030504040204" pitchFamily="34" charset="0"/>
               </a:rPr>
-              <a:t>Нуждаем се от глобално решение</a:t>
+              <a:t>Нуждаем се от глобално </a:t>
             </a:r>
+            <a:r>
+              <a:rPr lang="bg-BG" sz="2400" dirty="0" smtClean="0">
+                <a:latin typeface="Tahoma" panose="020B0604030504040204" pitchFamily="34" charset="0"/>
+                <a:ea typeface="Tahoma" panose="020B0604030504040204" pitchFamily="34" charset="0"/>
+                <a:cs typeface="Tahoma" panose="020B0604030504040204" pitchFamily="34" charset="0"/>
+              </a:rPr>
+              <a:t>решение.</a:t>
+            </a:r>
+            <a:endParaRPr lang="bg-BG" sz="2400" dirty="0" smtClean="0">
+              <a:latin typeface="Tahoma" panose="020B0604030504040204" pitchFamily="34" charset="0"/>
+              <a:ea typeface="Tahoma" panose="020B0604030504040204" pitchFamily="34" charset="0"/>
+              <a:cs typeface="Tahoma" panose="020B0604030504040204" pitchFamily="34" charset="0"/>
+            </a:endParaRPr>
           </a:p>
           <a:p>
             <a:pPr lvl="1"/>
@@ -16893,7 +16998,15 @@
                 <a:ea typeface="Tahoma" panose="020B0604030504040204" pitchFamily="34" charset="0"/>
                 <a:cs typeface="Tahoma" panose="020B0604030504040204" pitchFamily="34" charset="0"/>
               </a:rPr>
-              <a:t>Изграждане на дигитални платформи, които да решат поставените проблеми</a:t>
+              <a:t>Изграждане на дигитални платформи, които да решат поставените </a:t>
+            </a:r>
+            <a:r>
+              <a:rPr lang="bg-BG" sz="2400" dirty="0" smtClean="0">
+                <a:latin typeface="Tahoma" panose="020B0604030504040204" pitchFamily="34" charset="0"/>
+                <a:ea typeface="Tahoma" panose="020B0604030504040204" pitchFamily="34" charset="0"/>
+                <a:cs typeface="Tahoma" panose="020B0604030504040204" pitchFamily="34" charset="0"/>
+              </a:rPr>
+              <a:t>проблеми.</a:t>
             </a:r>
             <a:endParaRPr lang="en-US" sz="2400" dirty="0">
               <a:latin typeface="Tahoma" panose="020B0604030504040204" pitchFamily="34" charset="0"/>
@@ -17063,8 +17176,21 @@
                 <a:ea typeface="Tahoma" panose="020B0604030504040204" pitchFamily="34" charset="0"/>
                 <a:cs typeface="Tahoma" panose="020B0604030504040204" pitchFamily="34" charset="0"/>
               </a:rPr>
-              <a:t>Създаване на обучение с ресурси и задачи</a:t>
+              <a:t>Създаване на обучение с ресурси и </a:t>
             </a:r>
+            <a:r>
+              <a:rPr lang="bg-BG" sz="2400" dirty="0" smtClean="0">
+                <a:latin typeface="Tahoma" panose="020B0604030504040204" pitchFamily="34" charset="0"/>
+                <a:ea typeface="Tahoma" panose="020B0604030504040204" pitchFamily="34" charset="0"/>
+                <a:cs typeface="Tahoma" panose="020B0604030504040204" pitchFamily="34" charset="0"/>
+              </a:rPr>
+              <a:t>задачи.</a:t>
+            </a:r>
+            <a:endParaRPr lang="bg-BG" sz="2400" dirty="0" smtClean="0">
+              <a:latin typeface="Tahoma" panose="020B0604030504040204" pitchFamily="34" charset="0"/>
+              <a:ea typeface="Tahoma" panose="020B0604030504040204" pitchFamily="34" charset="0"/>
+              <a:cs typeface="Tahoma" panose="020B0604030504040204" pitchFamily="34" charset="0"/>
+            </a:endParaRPr>
           </a:p>
           <a:p>
             <a:pPr lvl="1"/>
@@ -17074,8 +17200,21 @@
                 <a:ea typeface="Tahoma" panose="020B0604030504040204" pitchFamily="34" charset="0"/>
                 <a:cs typeface="Tahoma" panose="020B0604030504040204" pitchFamily="34" charset="0"/>
               </a:rPr>
-              <a:t>Добавяне на тестове към задачите</a:t>
+              <a:t>Добавяне на тестове към </a:t>
             </a:r>
+            <a:r>
+              <a:rPr lang="bg-BG" sz="2400" dirty="0" smtClean="0">
+                <a:latin typeface="Tahoma" panose="020B0604030504040204" pitchFamily="34" charset="0"/>
+                <a:ea typeface="Tahoma" panose="020B0604030504040204" pitchFamily="34" charset="0"/>
+                <a:cs typeface="Tahoma" panose="020B0604030504040204" pitchFamily="34" charset="0"/>
+              </a:rPr>
+              <a:t>задачите.</a:t>
+            </a:r>
+            <a:endParaRPr lang="bg-BG" sz="2400" dirty="0" smtClean="0">
+              <a:latin typeface="Tahoma" panose="020B0604030504040204" pitchFamily="34" charset="0"/>
+              <a:ea typeface="Tahoma" panose="020B0604030504040204" pitchFamily="34" charset="0"/>
+              <a:cs typeface="Tahoma" panose="020B0604030504040204" pitchFamily="34" charset="0"/>
+            </a:endParaRPr>
           </a:p>
           <a:p>
             <a:pPr lvl="1"/>
@@ -17085,8 +17224,21 @@
                 <a:ea typeface="Tahoma" panose="020B0604030504040204" pitchFamily="34" charset="0"/>
                 <a:cs typeface="Tahoma" panose="020B0604030504040204" pitchFamily="34" charset="0"/>
               </a:rPr>
-              <a:t>Автоматично тестване на кода на учениците</a:t>
+              <a:t>Автоматично тестване на кода на </a:t>
             </a:r>
+            <a:r>
+              <a:rPr lang="bg-BG" sz="2400" dirty="0" smtClean="0">
+                <a:latin typeface="Tahoma" panose="020B0604030504040204" pitchFamily="34" charset="0"/>
+                <a:ea typeface="Tahoma" panose="020B0604030504040204" pitchFamily="34" charset="0"/>
+                <a:cs typeface="Tahoma" panose="020B0604030504040204" pitchFamily="34" charset="0"/>
+              </a:rPr>
+              <a:t>учениците.</a:t>
+            </a:r>
+            <a:endParaRPr lang="bg-BG" sz="2400" dirty="0" smtClean="0">
+              <a:latin typeface="Tahoma" panose="020B0604030504040204" pitchFamily="34" charset="0"/>
+              <a:ea typeface="Tahoma" panose="020B0604030504040204" pitchFamily="34" charset="0"/>
+              <a:cs typeface="Tahoma" panose="020B0604030504040204" pitchFamily="34" charset="0"/>
+            </a:endParaRPr>
           </a:p>
           <a:p>
             <a:pPr lvl="1"/>
@@ -17096,8 +17248,21 @@
                 <a:ea typeface="Tahoma" panose="020B0604030504040204" pitchFamily="34" charset="0"/>
                 <a:cs typeface="Tahoma" panose="020B0604030504040204" pitchFamily="34" charset="0"/>
               </a:rPr>
-              <a:t>Провеждане на изпити и контролни в системата</a:t>
+              <a:t>Провеждане на изпити и контролни в </a:t>
             </a:r>
+            <a:r>
+              <a:rPr lang="bg-BG" sz="2400" dirty="0" smtClean="0">
+                <a:latin typeface="Tahoma" panose="020B0604030504040204" pitchFamily="34" charset="0"/>
+                <a:ea typeface="Tahoma" panose="020B0604030504040204" pitchFamily="34" charset="0"/>
+                <a:cs typeface="Tahoma" panose="020B0604030504040204" pitchFamily="34" charset="0"/>
+              </a:rPr>
+              <a:t>системата.</a:t>
+            </a:r>
+            <a:endParaRPr lang="bg-BG" sz="2400" dirty="0" smtClean="0">
+              <a:latin typeface="Tahoma" panose="020B0604030504040204" pitchFamily="34" charset="0"/>
+              <a:ea typeface="Tahoma" panose="020B0604030504040204" pitchFamily="34" charset="0"/>
+              <a:cs typeface="Tahoma" panose="020B0604030504040204" pitchFamily="34" charset="0"/>
+            </a:endParaRPr>
           </a:p>
           <a:p>
             <a:pPr lvl="1"/>
@@ -17107,8 +17272,21 @@
                 <a:ea typeface="Tahoma" panose="020B0604030504040204" pitchFamily="34" charset="0"/>
                 <a:cs typeface="Tahoma" panose="020B0604030504040204" pitchFamily="34" charset="0"/>
               </a:rPr>
-              <a:t>Следене на резултатите на учениците и управление на съдържанието в системата</a:t>
+              <a:t>Следене на резултатите на учениците и управление на съдържанието в </a:t>
             </a:r>
+            <a:r>
+              <a:rPr lang="bg-BG" sz="2400" dirty="0" smtClean="0">
+                <a:latin typeface="Tahoma" panose="020B0604030504040204" pitchFamily="34" charset="0"/>
+                <a:ea typeface="Tahoma" panose="020B0604030504040204" pitchFamily="34" charset="0"/>
+                <a:cs typeface="Tahoma" panose="020B0604030504040204" pitchFamily="34" charset="0"/>
+              </a:rPr>
+              <a:t>системата.</a:t>
+            </a:r>
+            <a:endParaRPr lang="bg-BG" sz="2400" dirty="0" smtClean="0">
+              <a:latin typeface="Tahoma" panose="020B0604030504040204" pitchFamily="34" charset="0"/>
+              <a:ea typeface="Tahoma" panose="020B0604030504040204" pitchFamily="34" charset="0"/>
+              <a:cs typeface="Tahoma" panose="020B0604030504040204" pitchFamily="34" charset="0"/>
+            </a:endParaRPr>
           </a:p>
           <a:p>
             <a:pPr lvl="1"/>
@@ -17118,7 +17296,15 @@
                 <a:ea typeface="Tahoma" panose="020B0604030504040204" pitchFamily="34" charset="0"/>
                 <a:cs typeface="Tahoma" panose="020B0604030504040204" pitchFamily="34" charset="0"/>
               </a:rPr>
-              <a:t>Ще се ползва от учениците и учителите</a:t>
+              <a:t>Ще се ползва от учениците и </a:t>
+            </a:r>
+            <a:r>
+              <a:rPr lang="bg-BG" sz="2400" dirty="0" smtClean="0">
+                <a:latin typeface="Tahoma" panose="020B0604030504040204" pitchFamily="34" charset="0"/>
+                <a:ea typeface="Tahoma" panose="020B0604030504040204" pitchFamily="34" charset="0"/>
+                <a:cs typeface="Tahoma" panose="020B0604030504040204" pitchFamily="34" charset="0"/>
+              </a:rPr>
+              <a:t>учителите.</a:t>
             </a:r>
             <a:endParaRPr lang="en-US" sz="2400" dirty="0">
               <a:latin typeface="Tahoma" panose="020B0604030504040204" pitchFamily="34" charset="0"/>
@@ -17229,7 +17415,7 @@
         </p:spPr>
         <p:txBody>
           <a:bodyPr>
-            <a:normAutofit/>
+            <a:normAutofit lnSpcReduction="10000"/>
           </a:bodyPr>
           <a:lstStyle/>
           <a:p>
@@ -17240,7 +17426,15 @@
                 <a:ea typeface="Tahoma" panose="020B0604030504040204" pitchFamily="34" charset="0"/>
                 <a:cs typeface="Tahoma" panose="020B0604030504040204" pitchFamily="34" charset="0"/>
               </a:rPr>
-              <a:t>Училищата ще кандидатстват за инстанция на системата</a:t>
+              <a:t>Училищата ще кандидатстват за инстанция на </a:t>
+            </a:r>
+            <a:r>
+              <a:rPr lang="bg-BG" sz="2400" dirty="0" smtClean="0">
+                <a:latin typeface="Tahoma" panose="020B0604030504040204" pitchFamily="34" charset="0"/>
+                <a:ea typeface="Tahoma" panose="020B0604030504040204" pitchFamily="34" charset="0"/>
+                <a:cs typeface="Tahoma" panose="020B0604030504040204" pitchFamily="34" charset="0"/>
+              </a:rPr>
+              <a:t>системата.</a:t>
             </a:r>
             <a:endParaRPr lang="en-US" sz="2400" dirty="0">
               <a:latin typeface="Tahoma" panose="020B0604030504040204" pitchFamily="34" charset="0"/>
@@ -17272,7 +17466,15 @@
                 <a:ea typeface="Tahoma" panose="020B0604030504040204" pitchFamily="34" charset="0"/>
                 <a:cs typeface="Tahoma" panose="020B0604030504040204" pitchFamily="34" charset="0"/>
               </a:rPr>
-              <a:t>и очакван брой на потребителите</a:t>
+              <a:t>и очакван брой на </a:t>
+            </a:r>
+            <a:r>
+              <a:rPr lang="bg-BG" sz="2000" dirty="0" smtClean="0">
+                <a:latin typeface="Tahoma" panose="020B0604030504040204" pitchFamily="34" charset="0"/>
+                <a:ea typeface="Tahoma" panose="020B0604030504040204" pitchFamily="34" charset="0"/>
+                <a:cs typeface="Tahoma" panose="020B0604030504040204" pitchFamily="34" charset="0"/>
+              </a:rPr>
+              <a:t>потребителите.</a:t>
             </a:r>
             <a:endParaRPr lang="en-US" sz="2000" dirty="0">
               <a:latin typeface="Tahoma" panose="020B0604030504040204" pitchFamily="34" charset="0"/>
@@ -17288,7 +17490,15 @@
                 <a:ea typeface="Tahoma" panose="020B0604030504040204" pitchFamily="34" charset="0"/>
                 <a:cs typeface="Tahoma" panose="020B0604030504040204" pitchFamily="34" charset="0"/>
               </a:rPr>
-              <a:t>Посочва какви обучения искат да се добавят първоначално в системата</a:t>
+              <a:t>Посочва какви обучения искат да се добавят първоначално в </a:t>
+            </a:r>
+            <a:r>
+              <a:rPr lang="bg-BG" sz="2000" dirty="0" smtClean="0">
+                <a:latin typeface="Tahoma" panose="020B0604030504040204" pitchFamily="34" charset="0"/>
+                <a:ea typeface="Tahoma" panose="020B0604030504040204" pitchFamily="34" charset="0"/>
+                <a:cs typeface="Tahoma" panose="020B0604030504040204" pitchFamily="34" charset="0"/>
+              </a:rPr>
+              <a:t>системата.</a:t>
             </a:r>
             <a:endParaRPr lang="en-US" sz="2000" dirty="0">
               <a:latin typeface="Tahoma" panose="020B0604030504040204" pitchFamily="34" charset="0"/>
@@ -17304,7 +17514,15 @@
                 <a:ea typeface="Tahoma" panose="020B0604030504040204" pitchFamily="34" charset="0"/>
                 <a:cs typeface="Tahoma" panose="020B0604030504040204" pitchFamily="34" charset="0"/>
               </a:rPr>
-              <a:t>Изпращат допълнителни данни за кандидатурата</a:t>
+              <a:t>Изпращат допълнителни данни за </a:t>
+            </a:r>
+            <a:r>
+              <a:rPr lang="bg-BG" sz="2000" dirty="0" smtClean="0">
+                <a:latin typeface="Tahoma" panose="020B0604030504040204" pitchFamily="34" charset="0"/>
+                <a:ea typeface="Tahoma" panose="020B0604030504040204" pitchFamily="34" charset="0"/>
+                <a:cs typeface="Tahoma" panose="020B0604030504040204" pitchFamily="34" charset="0"/>
+              </a:rPr>
+              <a:t>кандидатурата.</a:t>
             </a:r>
             <a:endParaRPr lang="en-US" sz="2000" dirty="0">
               <a:latin typeface="Tahoma" panose="020B0604030504040204" pitchFamily="34" charset="0"/>
@@ -17320,8 +17538,21 @@
                 <a:ea typeface="Tahoma" panose="020B0604030504040204" pitchFamily="34" charset="0"/>
                 <a:cs typeface="Tahoma" panose="020B0604030504040204" pitchFamily="34" charset="0"/>
               </a:rPr>
-              <a:t>Управление и наблюдение на всички инстанции</a:t>
+              <a:t>Управление и наблюдение на всички </a:t>
             </a:r>
+            <a:r>
+              <a:rPr lang="bg-BG" sz="2400" dirty="0" smtClean="0">
+                <a:latin typeface="Tahoma" panose="020B0604030504040204" pitchFamily="34" charset="0"/>
+                <a:ea typeface="Tahoma" panose="020B0604030504040204" pitchFamily="34" charset="0"/>
+                <a:cs typeface="Tahoma" panose="020B0604030504040204" pitchFamily="34" charset="0"/>
+              </a:rPr>
+              <a:t>инстанции.</a:t>
+            </a:r>
+            <a:endParaRPr lang="bg-BG" sz="2400" dirty="0" smtClean="0">
+              <a:latin typeface="Tahoma" panose="020B0604030504040204" pitchFamily="34" charset="0"/>
+              <a:ea typeface="Tahoma" panose="020B0604030504040204" pitchFamily="34" charset="0"/>
+              <a:cs typeface="Tahoma" panose="020B0604030504040204" pitchFamily="34" charset="0"/>
+            </a:endParaRPr>
           </a:p>
           <a:p>
             <a:pPr lvl="1"/>
@@ -17331,8 +17562,21 @@
                 <a:ea typeface="Tahoma" panose="020B0604030504040204" pitchFamily="34" charset="0"/>
                 <a:cs typeface="Tahoma" panose="020B0604030504040204" pitchFamily="34" charset="0"/>
               </a:rPr>
-              <a:t>Създаване на съдържание – курсове, задачи, ресурси</a:t>
+              <a:t>Създаване на съдържание – курсове, задачи, </a:t>
             </a:r>
+            <a:r>
+              <a:rPr lang="bg-BG" sz="2400" dirty="0" smtClean="0">
+                <a:latin typeface="Tahoma" panose="020B0604030504040204" pitchFamily="34" charset="0"/>
+                <a:ea typeface="Tahoma" panose="020B0604030504040204" pitchFamily="34" charset="0"/>
+                <a:cs typeface="Tahoma" panose="020B0604030504040204" pitchFamily="34" charset="0"/>
+              </a:rPr>
+              <a:t>ресурси.</a:t>
+            </a:r>
+            <a:endParaRPr lang="bg-BG" sz="2400" dirty="0" smtClean="0">
+              <a:latin typeface="Tahoma" panose="020B0604030504040204" pitchFamily="34" charset="0"/>
+              <a:ea typeface="Tahoma" panose="020B0604030504040204" pitchFamily="34" charset="0"/>
+              <a:cs typeface="Tahoma" panose="020B0604030504040204" pitchFamily="34" charset="0"/>
+            </a:endParaRPr>
           </a:p>
           <a:p>
             <a:pPr lvl="1"/>
@@ -17342,7 +17586,15 @@
                 <a:ea typeface="Tahoma" panose="020B0604030504040204" pitchFamily="34" charset="0"/>
                 <a:cs typeface="Tahoma" panose="020B0604030504040204" pitchFamily="34" charset="0"/>
               </a:rPr>
-              <a:t>Добавяне на курс от списъка с курсове към инстанция на системата</a:t>
+              <a:t>Добавяне на курс от списъка с курсове към инстанция на </a:t>
+            </a:r>
+            <a:r>
+              <a:rPr lang="bg-BG" sz="2400" dirty="0" smtClean="0">
+                <a:latin typeface="Tahoma" panose="020B0604030504040204" pitchFamily="34" charset="0"/>
+                <a:ea typeface="Tahoma" panose="020B0604030504040204" pitchFamily="34" charset="0"/>
+                <a:cs typeface="Tahoma" panose="020B0604030504040204" pitchFamily="34" charset="0"/>
+              </a:rPr>
+              <a:t>системата.</a:t>
             </a:r>
             <a:endParaRPr lang="bg-BG" sz="2400" dirty="0">
               <a:latin typeface="Tahoma" panose="020B0604030504040204" pitchFamily="34" charset="0"/>
@@ -17358,8 +17610,21 @@
                 <a:ea typeface="Tahoma" panose="020B0604030504040204" pitchFamily="34" charset="0"/>
                 <a:cs typeface="Tahoma" panose="020B0604030504040204" pitchFamily="34" charset="0"/>
               </a:rPr>
-              <a:t>Заявка за скалиране на инстанция</a:t>
+              <a:t>Заявка за скалиране на </a:t>
             </a:r>
+            <a:r>
+              <a:rPr lang="bg-BG" sz="2400" dirty="0" smtClean="0">
+                <a:latin typeface="Tahoma" panose="020B0604030504040204" pitchFamily="34" charset="0"/>
+                <a:ea typeface="Tahoma" panose="020B0604030504040204" pitchFamily="34" charset="0"/>
+                <a:cs typeface="Tahoma" panose="020B0604030504040204" pitchFamily="34" charset="0"/>
+              </a:rPr>
+              <a:t>инстанция.</a:t>
+            </a:r>
+            <a:endParaRPr lang="bg-BG" sz="2400" dirty="0" smtClean="0">
+              <a:latin typeface="Tahoma" panose="020B0604030504040204" pitchFamily="34" charset="0"/>
+              <a:ea typeface="Tahoma" panose="020B0604030504040204" pitchFamily="34" charset="0"/>
+              <a:cs typeface="Tahoma" panose="020B0604030504040204" pitchFamily="34" charset="0"/>
+            </a:endParaRPr>
           </a:p>
           <a:p>
             <a:pPr lvl="1"/>
@@ -17401,8 +17666,21 @@
                 <a:ea typeface="Tahoma" panose="020B0604030504040204" pitchFamily="34" charset="0"/>
                 <a:cs typeface="Tahoma" panose="020B0604030504040204" pitchFamily="34" charset="0"/>
               </a:rPr>
-              <a:t>на нова инстанция</a:t>
+              <a:t>на нова </a:t>
             </a:r>
+            <a:r>
+              <a:rPr lang="bg-BG" sz="2400" dirty="0" smtClean="0">
+                <a:latin typeface="Tahoma" panose="020B0604030504040204" pitchFamily="34" charset="0"/>
+                <a:ea typeface="Tahoma" panose="020B0604030504040204" pitchFamily="34" charset="0"/>
+                <a:cs typeface="Tahoma" panose="020B0604030504040204" pitchFamily="34" charset="0"/>
+              </a:rPr>
+              <a:t>инстанция.</a:t>
+            </a:r>
+            <a:endParaRPr lang="bg-BG" sz="2400" dirty="0" smtClean="0">
+              <a:latin typeface="Tahoma" panose="020B0604030504040204" pitchFamily="34" charset="0"/>
+              <a:ea typeface="Tahoma" panose="020B0604030504040204" pitchFamily="34" charset="0"/>
+              <a:cs typeface="Tahoma" panose="020B0604030504040204" pitchFamily="34" charset="0"/>
+            </a:endParaRPr>
           </a:p>
         </p:txBody>
       </p:sp>
@@ -17513,8 +17791,21 @@
                 <a:ea typeface="Tahoma" panose="020B0604030504040204" pitchFamily="34" charset="0"/>
                 <a:cs typeface="Tahoma" panose="020B0604030504040204" pitchFamily="34" charset="0"/>
               </a:rPr>
-              <a:t>Начин за допринасяне към разработването на обученията</a:t>
+              <a:t>Начин за допринасяне към разработването на </a:t>
             </a:r>
+            <a:r>
+              <a:rPr lang="bg-BG" dirty="0" smtClean="0">
+                <a:latin typeface="Tahoma" panose="020B0604030504040204" pitchFamily="34" charset="0"/>
+                <a:ea typeface="Tahoma" panose="020B0604030504040204" pitchFamily="34" charset="0"/>
+                <a:cs typeface="Tahoma" panose="020B0604030504040204" pitchFamily="34" charset="0"/>
+              </a:rPr>
+              <a:t>обученията.</a:t>
+            </a:r>
+            <a:endParaRPr lang="bg-BG" dirty="0" smtClean="0">
+              <a:latin typeface="Tahoma" panose="020B0604030504040204" pitchFamily="34" charset="0"/>
+              <a:ea typeface="Tahoma" panose="020B0604030504040204" pitchFamily="34" charset="0"/>
+              <a:cs typeface="Tahoma" panose="020B0604030504040204" pitchFamily="34" charset="0"/>
+            </a:endParaRPr>
           </a:p>
           <a:p>
             <a:pPr lvl="0"/>
@@ -17548,7 +17839,15 @@
                 <a:ea typeface="Tahoma" panose="020B0604030504040204" pitchFamily="34" charset="0"/>
                 <a:cs typeface="Tahoma" panose="020B0604030504040204" pitchFamily="34" charset="0"/>
               </a:rPr>
-              <a:t> за добавяне на този курс в системата</a:t>
+              <a:t> за добавяне на този курс в </a:t>
+            </a:r>
+            <a:r>
+              <a:rPr lang="bg-BG" dirty="0" smtClean="0">
+                <a:latin typeface="Tahoma" panose="020B0604030504040204" pitchFamily="34" charset="0"/>
+                <a:ea typeface="Tahoma" panose="020B0604030504040204" pitchFamily="34" charset="0"/>
+                <a:cs typeface="Tahoma" panose="020B0604030504040204" pitchFamily="34" charset="0"/>
+              </a:rPr>
+              <a:t>системата.</a:t>
             </a:r>
             <a:endParaRPr lang="en-US" dirty="0" smtClean="0">
               <a:latin typeface="Tahoma" panose="020B0604030504040204" pitchFamily="34" charset="0"/>
@@ -17588,8 +17887,13 @@
                 <a:ea typeface="Tahoma" panose="020B0604030504040204" pitchFamily="34" charset="0"/>
                 <a:cs typeface="Tahoma" panose="020B0604030504040204" pitchFamily="34" charset="0"/>
               </a:rPr>
-              <a:t>методологиите</a:t>
+              <a:t>методологиите.</a:t>
             </a:r>
+            <a:endParaRPr lang="bg-BG" dirty="0" smtClean="0">
+              <a:latin typeface="Tahoma" panose="020B0604030504040204" pitchFamily="34" charset="0"/>
+              <a:ea typeface="Tahoma" panose="020B0604030504040204" pitchFamily="34" charset="0"/>
+              <a:cs typeface="Tahoma" panose="020B0604030504040204" pitchFamily="34" charset="0"/>
+            </a:endParaRPr>
           </a:p>
           <a:p>
             <a:pPr lvl="1"/>
@@ -17599,7 +17903,15 @@
                 <a:ea typeface="Tahoma" panose="020B0604030504040204" pitchFamily="34" charset="0"/>
                 <a:cs typeface="Tahoma" panose="020B0604030504040204" pitchFamily="34" charset="0"/>
               </a:rPr>
-              <a:t>Две училища ще могат да си помагат при разработване на съдържание</a:t>
+              <a:t>Две училища ще могат да си помагат при разработване на </a:t>
+            </a:r>
+            <a:r>
+              <a:rPr lang="bg-BG" dirty="0" smtClean="0">
+                <a:latin typeface="Tahoma" panose="020B0604030504040204" pitchFamily="34" charset="0"/>
+                <a:ea typeface="Tahoma" panose="020B0604030504040204" pitchFamily="34" charset="0"/>
+                <a:cs typeface="Tahoma" panose="020B0604030504040204" pitchFamily="34" charset="0"/>
+              </a:rPr>
+              <a:t>съдържание.</a:t>
             </a:r>
             <a:endParaRPr lang="en-US" dirty="0">
               <a:latin typeface="Tahoma" panose="020B0604030504040204" pitchFamily="34" charset="0"/>
@@ -17614,7 +17926,7 @@
                 <a:ea typeface="Tahoma" panose="020B0604030504040204" pitchFamily="34" charset="0"/>
                 <a:cs typeface="Tahoma" panose="020B0604030504040204" pitchFamily="34" charset="0"/>
               </a:rPr>
-              <a:t>Училище ще може да направи заявка за добавяне на курс, който е в </a:t>
+              <a:t>Училище ще може да направи заявка за добавяне на курс, който е в тяхната инстанция, към списъка с курсове в </a:t>
             </a:r>
             <a:r>
               <a:rPr lang="bg-BG" smtClean="0">
@@ -17622,15 +17934,15 @@
                 <a:ea typeface="Tahoma" panose="020B0604030504040204" pitchFamily="34" charset="0"/>
                 <a:cs typeface="Tahoma" panose="020B0604030504040204" pitchFamily="34" charset="0"/>
               </a:rPr>
-              <a:t>тяхната инстанция, </a:t>
+              <a:t>тази </a:t>
             </a:r>
             <a:r>
-              <a:rPr lang="bg-BG" dirty="0" smtClean="0">
+              <a:rPr lang="bg-BG" smtClean="0">
                 <a:latin typeface="Tahoma" panose="020B0604030504040204" pitchFamily="34" charset="0"/>
                 <a:ea typeface="Tahoma" panose="020B0604030504040204" pitchFamily="34" charset="0"/>
                 <a:cs typeface="Tahoma" panose="020B0604030504040204" pitchFamily="34" charset="0"/>
               </a:rPr>
-              <a:t>към списъка с курсове в тази платформа</a:t>
+              <a:t>платформа.</a:t>
             </a:r>
             <a:endParaRPr lang="en-US" dirty="0">
               <a:latin typeface="Tahoma" panose="020B0604030504040204" pitchFamily="34" charset="0"/>
@@ -18502,20 +18814,20 @@
 </file>
 
 <file path=customXml/item1.xml><?xml version="1.0" encoding="utf-8"?>
-<p:properties xmlns:p="http://schemas.microsoft.com/office/2006/metadata/properties" xmlns:xsi="http://www.w3.org/2001/XMLSchema-instance" xmlns:pc="http://schemas.microsoft.com/office/infopath/2007/PartnerControls">
-  <documentManagement>
-    <MediaServiceKeyPoints xmlns="71af3243-3dd4-4a8d-8c0d-dd76da1f02a5" xsi:nil="true"/>
-  </documentManagement>
-</p:properties>
-</file>
-
-<file path=customXml/item2.xml><?xml version="1.0" encoding="utf-8"?>
 <?mso-contentType ?>
 <FormTemplates xmlns="http://schemas.microsoft.com/sharepoint/v3/contenttype/forms">
   <Display>DocumentLibraryForm</Display>
   <Edit>DocumentLibraryForm</Edit>
   <New>DocumentLibraryForm</New>
 </FormTemplates>
+</file>
+
+<file path=customXml/item2.xml><?xml version="1.0" encoding="utf-8"?>
+<p:properties xmlns:p="http://schemas.microsoft.com/office/2006/metadata/properties" xmlns:xsi="http://www.w3.org/2001/XMLSchema-instance" xmlns:pc="http://schemas.microsoft.com/office/infopath/2007/PartnerControls">
+  <documentManagement>
+    <MediaServiceKeyPoints xmlns="71af3243-3dd4-4a8d-8c0d-dd76da1f02a5" xsi:nil="true"/>
+  </documentManagement>
+</p:properties>
 </file>
 
 <file path=customXml/item3.xml><?xml version="1.0" encoding="utf-8"?>
@@ -18730,19 +19042,19 @@
 </file>
 
 <file path=customXml/itemProps1.xml><?xml version="1.0" encoding="utf-8"?>
+<ds:datastoreItem xmlns:ds="http://schemas.openxmlformats.org/officeDocument/2006/customXml" ds:itemID="{B579702B-25C7-40D7-9E29-7686B11A9660}">
+  <ds:schemaRefs>
+    <ds:schemaRef ds:uri="http://schemas.microsoft.com/sharepoint/v3/contenttype/forms"/>
+  </ds:schemaRefs>
+</ds:datastoreItem>
+</file>
+
+<file path=customXml/itemProps2.xml><?xml version="1.0" encoding="utf-8"?>
 <ds:datastoreItem xmlns:ds="http://schemas.openxmlformats.org/officeDocument/2006/customXml" ds:itemID="{E7866CFD-F94E-4AE5-ACEA-86FEC0F48A10}">
   <ds:schemaRefs>
     <ds:schemaRef ds:uri="http://schemas.microsoft.com/office/2006/metadata/properties"/>
     <ds:schemaRef ds:uri="http://schemas.microsoft.com/office/infopath/2007/PartnerControls"/>
     <ds:schemaRef ds:uri="71af3243-3dd4-4a8d-8c0d-dd76da1f02a5"/>
-  </ds:schemaRefs>
-</ds:datastoreItem>
-</file>
-
-<file path=customXml/itemProps2.xml><?xml version="1.0" encoding="utf-8"?>
-<ds:datastoreItem xmlns:ds="http://schemas.openxmlformats.org/officeDocument/2006/customXml" ds:itemID="{B579702B-25C7-40D7-9E29-7686B11A9660}">
-  <ds:schemaRefs>
-    <ds:schemaRef ds:uri="http://schemas.microsoft.com/sharepoint/v3/contenttype/forms"/>
   </ds:schemaRefs>
 </ds:datastoreItem>
 </file>

</xml_diff>